<commit_message>
Added adjustment for rate changes per site
</commit_message>
<xml_diff>
--- a/Hot Pursuit/IPS.pptx
+++ b/Hot Pursuit/IPS.pptx
@@ -118,8 +118,7 @@
 <file path=ppt/revisionInfo.xml><?xml version="1.0" encoding="utf-8"?>
 <p1510:revInfo xmlns:a="http://schemas.openxmlformats.org/drawingml/2006/main" xmlns:r="http://schemas.openxmlformats.org/officeDocument/2006/relationships" xmlns:p1510="http://schemas.microsoft.com/office/powerpoint/2015/10/main">
   <p1510:revLst>
-    <p1510:client id="{CC2180D3-344B-421C-8A7C-7CF00190F422}" v="477" dt="2021-05-18T13:43:34.122"/>
-    <p1510:client id="{E41D39D8-1DDF-4D16-8E53-9090773FDB52}" v="631" dt="2021-05-19T02:59:39.942"/>
+    <p1510:client id="{E41D39D8-1DDF-4D16-8E53-9090773FDB52}" v="768" dt="2021-05-19T23:57:07.314"/>
   </p1510:revLst>
 </p1510:revInfo>
 </file>
@@ -129,7 +128,7 @@
   <pc:docChgLst>
     <pc:chgData name="Rick McAlister" userId="fad37fcb1da1ebec" providerId="LiveId" clId="{E41D39D8-1DDF-4D16-8E53-9090773FDB52}"/>
     <pc:docChg chg="undo redo custSel modSld">
-      <pc:chgData name="Rick McAlister" userId="fad37fcb1da1ebec" providerId="LiveId" clId="{E41D39D8-1DDF-4D16-8E53-9090773FDB52}" dt="2021-05-19T03:01:33.860" v="788" actId="1076"/>
+      <pc:chgData name="Rick McAlister" userId="fad37fcb1da1ebec" providerId="LiveId" clId="{E41D39D8-1DDF-4D16-8E53-9090773FDB52}" dt="2021-05-19T23:57:07.314" v="1101" actId="20577"/>
       <pc:docMkLst>
         <pc:docMk/>
       </pc:docMkLst>
@@ -157,13 +156,13 @@
         </pc:picChg>
       </pc:sldChg>
       <pc:sldChg chg="addSp delSp modSp mod">
-        <pc:chgData name="Rick McAlister" userId="fad37fcb1da1ebec" providerId="LiveId" clId="{E41D39D8-1DDF-4D16-8E53-9090773FDB52}" dt="2021-05-19T03:01:33.860" v="788" actId="1076"/>
+        <pc:chgData name="Rick McAlister" userId="fad37fcb1da1ebec" providerId="LiveId" clId="{E41D39D8-1DDF-4D16-8E53-9090773FDB52}" dt="2021-05-19T23:57:07.314" v="1101" actId="20577"/>
         <pc:sldMkLst>
           <pc:docMk/>
           <pc:sldMk cId="1809675145" sldId="258"/>
         </pc:sldMkLst>
         <pc:spChg chg="add mod">
-          <ac:chgData name="Rick McAlister" userId="fad37fcb1da1ebec" providerId="LiveId" clId="{E41D39D8-1DDF-4D16-8E53-9090773FDB52}" dt="2021-05-19T03:01:08.583" v="786" actId="552"/>
+          <ac:chgData name="Rick McAlister" userId="fad37fcb1da1ebec" providerId="LiveId" clId="{E41D39D8-1DDF-4D16-8E53-9090773FDB52}" dt="2021-05-19T17:58:52.486" v="1030" actId="1076"/>
           <ac:spMkLst>
             <pc:docMk/>
             <pc:sldMk cId="1809675145" sldId="258"/>
@@ -171,7 +170,7 @@
           </ac:spMkLst>
         </pc:spChg>
         <pc:spChg chg="add mod">
-          <ac:chgData name="Rick McAlister" userId="fad37fcb1da1ebec" providerId="LiveId" clId="{E41D39D8-1DDF-4D16-8E53-9090773FDB52}" dt="2021-05-19T03:00:24.780" v="782" actId="1076"/>
+          <ac:chgData name="Rick McAlister" userId="fad37fcb1da1ebec" providerId="LiveId" clId="{E41D39D8-1DDF-4D16-8E53-9090773FDB52}" dt="2021-05-19T17:56:04.015" v="1015" actId="688"/>
           <ac:spMkLst>
             <pc:docMk/>
             <pc:sldMk cId="1809675145" sldId="258"/>
@@ -179,7 +178,7 @@
           </ac:spMkLst>
         </pc:spChg>
         <pc:spChg chg="mod">
-          <ac:chgData name="Rick McAlister" userId="fad37fcb1da1ebec" providerId="LiveId" clId="{E41D39D8-1DDF-4D16-8E53-9090773FDB52}" dt="2021-05-19T03:00:24.780" v="782" actId="1076"/>
+          <ac:chgData name="Rick McAlister" userId="fad37fcb1da1ebec" providerId="LiveId" clId="{E41D39D8-1DDF-4D16-8E53-9090773FDB52}" dt="2021-05-19T17:56:04.015" v="1015" actId="688"/>
           <ac:spMkLst>
             <pc:docMk/>
             <pc:sldMk cId="1809675145" sldId="258"/>
@@ -187,7 +186,7 @@
           </ac:spMkLst>
         </pc:spChg>
         <pc:spChg chg="add mod">
-          <ac:chgData name="Rick McAlister" userId="fad37fcb1da1ebec" providerId="LiveId" clId="{E41D39D8-1DDF-4D16-8E53-9090773FDB52}" dt="2021-05-19T03:01:08.583" v="786" actId="552"/>
+          <ac:chgData name="Rick McAlister" userId="fad37fcb1da1ebec" providerId="LiveId" clId="{E41D39D8-1DDF-4D16-8E53-9090773FDB52}" dt="2021-05-19T17:59:02.191" v="1031" actId="1076"/>
           <ac:spMkLst>
             <pc:docMk/>
             <pc:sldMk cId="1809675145" sldId="258"/>
@@ -195,7 +194,7 @@
           </ac:spMkLst>
         </pc:spChg>
         <pc:spChg chg="add mod">
-          <ac:chgData name="Rick McAlister" userId="fad37fcb1da1ebec" providerId="LiveId" clId="{E41D39D8-1DDF-4D16-8E53-9090773FDB52}" dt="2021-05-19T03:01:08.583" v="786" actId="552"/>
+          <ac:chgData name="Rick McAlister" userId="fad37fcb1da1ebec" providerId="LiveId" clId="{E41D39D8-1DDF-4D16-8E53-9090773FDB52}" dt="2021-05-19T17:58:45.142" v="1029" actId="1076"/>
           <ac:spMkLst>
             <pc:docMk/>
             <pc:sldMk cId="1809675145" sldId="258"/>
@@ -203,7 +202,7 @@
           </ac:spMkLst>
         </pc:spChg>
         <pc:spChg chg="add mod">
-          <ac:chgData name="Rick McAlister" userId="fad37fcb1da1ebec" providerId="LiveId" clId="{E41D39D8-1DDF-4D16-8E53-9090773FDB52}" dt="2021-05-19T03:01:33.860" v="788" actId="1076"/>
+          <ac:chgData name="Rick McAlister" userId="fad37fcb1da1ebec" providerId="LiveId" clId="{E41D39D8-1DDF-4D16-8E53-9090773FDB52}" dt="2021-05-19T17:58:45.142" v="1029" actId="1076"/>
           <ac:spMkLst>
             <pc:docMk/>
             <pc:sldMk cId="1809675145" sldId="258"/>
@@ -211,7 +210,7 @@
           </ac:spMkLst>
         </pc:spChg>
         <pc:spChg chg="add mod">
-          <ac:chgData name="Rick McAlister" userId="fad37fcb1da1ebec" providerId="LiveId" clId="{E41D39D8-1DDF-4D16-8E53-9090773FDB52}" dt="2021-05-19T02:32:19.244" v="574" actId="164"/>
+          <ac:chgData name="Rick McAlister" userId="fad37fcb1da1ebec" providerId="LiveId" clId="{E41D39D8-1DDF-4D16-8E53-9090773FDB52}" dt="2021-05-19T17:42:52.117" v="845" actId="20577"/>
           <ac:spMkLst>
             <pc:docMk/>
             <pc:sldMk cId="1809675145" sldId="258"/>
@@ -219,7 +218,7 @@
           </ac:spMkLst>
         </pc:spChg>
         <pc:spChg chg="add mod">
-          <ac:chgData name="Rick McAlister" userId="fad37fcb1da1ebec" providerId="LiveId" clId="{E41D39D8-1DDF-4D16-8E53-9090773FDB52}" dt="2021-05-19T03:00:24.780" v="782" actId="1076"/>
+          <ac:chgData name="Rick McAlister" userId="fad37fcb1da1ebec" providerId="LiveId" clId="{E41D39D8-1DDF-4D16-8E53-9090773FDB52}" dt="2021-05-19T17:56:04.015" v="1015" actId="688"/>
           <ac:spMkLst>
             <pc:docMk/>
             <pc:sldMk cId="1809675145" sldId="258"/>
@@ -227,7 +226,7 @@
           </ac:spMkLst>
         </pc:spChg>
         <pc:spChg chg="add mod">
-          <ac:chgData name="Rick McAlister" userId="fad37fcb1da1ebec" providerId="LiveId" clId="{E41D39D8-1DDF-4D16-8E53-9090773FDB52}" dt="2021-05-19T02:32:19.244" v="574" actId="164"/>
+          <ac:chgData name="Rick McAlister" userId="fad37fcb1da1ebec" providerId="LiveId" clId="{E41D39D8-1DDF-4D16-8E53-9090773FDB52}" dt="2021-05-19T17:42:52.117" v="845" actId="20577"/>
           <ac:spMkLst>
             <pc:docMk/>
             <pc:sldMk cId="1809675145" sldId="258"/>
@@ -235,7 +234,7 @@
           </ac:spMkLst>
         </pc:spChg>
         <pc:spChg chg="add mod">
-          <ac:chgData name="Rick McAlister" userId="fad37fcb1da1ebec" providerId="LiveId" clId="{E41D39D8-1DDF-4D16-8E53-9090773FDB52}" dt="2021-05-19T02:32:19.244" v="574" actId="164"/>
+          <ac:chgData name="Rick McAlister" userId="fad37fcb1da1ebec" providerId="LiveId" clId="{E41D39D8-1DDF-4D16-8E53-9090773FDB52}" dt="2021-05-19T17:42:52.117" v="845" actId="20577"/>
           <ac:spMkLst>
             <pc:docMk/>
             <pc:sldMk cId="1809675145" sldId="258"/>
@@ -250,24 +249,40 @@
             <ac:spMk id="17" creationId="{7304BC89-ECC0-4B37-99EA-D1EEC5D05916}"/>
           </ac:spMkLst>
         </pc:spChg>
+        <pc:spChg chg="add del mod">
+          <ac:chgData name="Rick McAlister" userId="fad37fcb1da1ebec" providerId="LiveId" clId="{E41D39D8-1DDF-4D16-8E53-9090773FDB52}" dt="2021-05-19T21:32:54.004" v="1045" actId="478"/>
+          <ac:spMkLst>
+            <pc:docMk/>
+            <pc:sldMk cId="1809675145" sldId="258"/>
+            <ac:spMk id="17" creationId="{A6BE7A88-2F88-4030-9BD6-790BB9529C3F}"/>
+          </ac:spMkLst>
+        </pc:spChg>
+        <pc:spChg chg="add mod">
+          <ac:chgData name="Rick McAlister" userId="fad37fcb1da1ebec" providerId="LiveId" clId="{E41D39D8-1DDF-4D16-8E53-9090773FDB52}" dt="2021-05-19T23:57:07.314" v="1101" actId="20577"/>
+          <ac:spMkLst>
+            <pc:docMk/>
+            <pc:sldMk cId="1809675145" sldId="258"/>
+            <ac:spMk id="18" creationId="{2CFED8A8-9E02-4F65-8543-EEDDE141D5DE}"/>
+          </ac:spMkLst>
+        </pc:spChg>
         <pc:spChg chg="mod">
-          <ac:chgData name="Rick McAlister" userId="fad37fcb1da1ebec" providerId="LiveId" clId="{E41D39D8-1DDF-4D16-8E53-9090773FDB52}" dt="2021-05-19T03:00:24.780" v="782" actId="1076"/>
+          <ac:chgData name="Rick McAlister" userId="fad37fcb1da1ebec" providerId="LiveId" clId="{E41D39D8-1DDF-4D16-8E53-9090773FDB52}" dt="2021-05-19T17:57:39.391" v="1022" actId="14100"/>
           <ac:spMkLst>
             <pc:docMk/>
             <pc:sldMk cId="1809675145" sldId="258"/>
             <ac:spMk id="19" creationId="{6FEB324D-BC6E-41AA-B677-849C6CCB97FD}"/>
           </ac:spMkLst>
         </pc:spChg>
-        <pc:spChg chg="mod">
-          <ac:chgData name="Rick McAlister" userId="fad37fcb1da1ebec" providerId="LiveId" clId="{E41D39D8-1DDF-4D16-8E53-9090773FDB52}" dt="2021-05-19T03:00:24.780" v="782" actId="1076"/>
+        <pc:spChg chg="del mod">
+          <ac:chgData name="Rick McAlister" userId="fad37fcb1da1ebec" providerId="LiveId" clId="{E41D39D8-1DDF-4D16-8E53-9090773FDB52}" dt="2021-05-19T17:35:46.007" v="792" actId="478"/>
           <ac:spMkLst>
             <pc:docMk/>
             <pc:sldMk cId="1809675145" sldId="258"/>
             <ac:spMk id="20" creationId="{F41EBB94-8AF1-4AD5-BCEF-A3B5B172014D}"/>
           </ac:spMkLst>
         </pc:spChg>
-        <pc:spChg chg="mod">
-          <ac:chgData name="Rick McAlister" userId="fad37fcb1da1ebec" providerId="LiveId" clId="{E41D39D8-1DDF-4D16-8E53-9090773FDB52}" dt="2021-05-19T03:00:24.780" v="782" actId="1076"/>
+        <pc:spChg chg="del mod">
+          <ac:chgData name="Rick McAlister" userId="fad37fcb1da1ebec" providerId="LiveId" clId="{E41D39D8-1DDF-4D16-8E53-9090773FDB52}" dt="2021-05-19T17:35:48.538" v="793" actId="478"/>
           <ac:spMkLst>
             <pc:docMk/>
             <pc:sldMk cId="1809675145" sldId="258"/>
@@ -275,7 +290,7 @@
           </ac:spMkLst>
         </pc:spChg>
         <pc:spChg chg="mod">
-          <ac:chgData name="Rick McAlister" userId="fad37fcb1da1ebec" providerId="LiveId" clId="{E41D39D8-1DDF-4D16-8E53-9090773FDB52}" dt="2021-05-19T03:00:24.780" v="782" actId="1076"/>
+          <ac:chgData name="Rick McAlister" userId="fad37fcb1da1ebec" providerId="LiveId" clId="{E41D39D8-1DDF-4D16-8E53-9090773FDB52}" dt="2021-05-19T17:56:04.015" v="1015" actId="688"/>
           <ac:spMkLst>
             <pc:docMk/>
             <pc:sldMk cId="1809675145" sldId="258"/>
@@ -283,7 +298,7 @@
           </ac:spMkLst>
         </pc:spChg>
         <pc:spChg chg="add mod">
-          <ac:chgData name="Rick McAlister" userId="fad37fcb1da1ebec" providerId="LiveId" clId="{E41D39D8-1DDF-4D16-8E53-9090773FDB52}" dt="2021-05-19T03:00:24.780" v="782" actId="1076"/>
+          <ac:chgData name="Rick McAlister" userId="fad37fcb1da1ebec" providerId="LiveId" clId="{E41D39D8-1DDF-4D16-8E53-9090773FDB52}" dt="2021-05-19T17:58:29.403" v="1028" actId="1076"/>
           <ac:spMkLst>
             <pc:docMk/>
             <pc:sldMk cId="1809675145" sldId="258"/>
@@ -323,15 +338,15 @@
           </ac:spMkLst>
         </pc:spChg>
         <pc:spChg chg="mod">
-          <ac:chgData name="Rick McAlister" userId="fad37fcb1da1ebec" providerId="LiveId" clId="{E41D39D8-1DDF-4D16-8E53-9090773FDB52}" dt="2021-05-19T03:00:24.780" v="782" actId="1076"/>
+          <ac:chgData name="Rick McAlister" userId="fad37fcb1da1ebec" providerId="LiveId" clId="{E41D39D8-1DDF-4D16-8E53-9090773FDB52}" dt="2021-05-19T17:56:04.015" v="1015" actId="688"/>
           <ac:spMkLst>
             <pc:docMk/>
             <pc:sldMk cId="1809675145" sldId="258"/>
             <ac:spMk id="29" creationId="{4804FAF1-AE02-4084-AA46-C24F9B058E78}"/>
           </ac:spMkLst>
         </pc:spChg>
-        <pc:spChg chg="add mod">
-          <ac:chgData name="Rick McAlister" userId="fad37fcb1da1ebec" providerId="LiveId" clId="{E41D39D8-1DDF-4D16-8E53-9090773FDB52}" dt="2021-05-19T03:00:24.780" v="782" actId="1076"/>
+        <pc:spChg chg="add del mod">
+          <ac:chgData name="Rick McAlister" userId="fad37fcb1da1ebec" providerId="LiveId" clId="{E41D39D8-1DDF-4D16-8E53-9090773FDB52}" dt="2021-05-19T17:35:42.648" v="791" actId="478"/>
           <ac:spMkLst>
             <pc:docMk/>
             <pc:sldMk cId="1809675145" sldId="258"/>
@@ -339,7 +354,7 @@
           </ac:spMkLst>
         </pc:spChg>
         <pc:spChg chg="mod">
-          <ac:chgData name="Rick McAlister" userId="fad37fcb1da1ebec" providerId="LiveId" clId="{E41D39D8-1DDF-4D16-8E53-9090773FDB52}" dt="2021-05-19T03:00:24.780" v="782" actId="1076"/>
+          <ac:chgData name="Rick McAlister" userId="fad37fcb1da1ebec" providerId="LiveId" clId="{E41D39D8-1DDF-4D16-8E53-9090773FDB52}" dt="2021-05-19T17:58:20.137" v="1026" actId="1076"/>
           <ac:spMkLst>
             <pc:docMk/>
             <pc:sldMk cId="1809675145" sldId="258"/>
@@ -362,8 +377,8 @@
             <ac:spMk id="33" creationId="{0F3D8E35-DDE3-46CA-BD12-97AC821659F7}"/>
           </ac:spMkLst>
         </pc:spChg>
-        <pc:spChg chg="add mod">
-          <ac:chgData name="Rick McAlister" userId="fad37fcb1da1ebec" providerId="LiveId" clId="{E41D39D8-1DDF-4D16-8E53-9090773FDB52}" dt="2021-05-19T03:00:24.780" v="782" actId="1076"/>
+        <pc:spChg chg="add del mod">
+          <ac:chgData name="Rick McAlister" userId="fad37fcb1da1ebec" providerId="LiveId" clId="{E41D39D8-1DDF-4D16-8E53-9090773FDB52}" dt="2021-05-19T17:35:38.476" v="790" actId="478"/>
           <ac:spMkLst>
             <pc:docMk/>
             <pc:sldMk cId="1809675145" sldId="258"/>
@@ -371,15 +386,15 @@
           </ac:spMkLst>
         </pc:spChg>
         <pc:spChg chg="add mod">
-          <ac:chgData name="Rick McAlister" userId="fad37fcb1da1ebec" providerId="LiveId" clId="{E41D39D8-1DDF-4D16-8E53-9090773FDB52}" dt="2021-05-19T03:01:08.583" v="786" actId="552"/>
+          <ac:chgData name="Rick McAlister" userId="fad37fcb1da1ebec" providerId="LiveId" clId="{E41D39D8-1DDF-4D16-8E53-9090773FDB52}" dt="2021-05-19T17:59:15.483" v="1033" actId="1076"/>
           <ac:spMkLst>
             <pc:docMk/>
             <pc:sldMk cId="1809675145" sldId="258"/>
             <ac:spMk id="35" creationId="{B65B9E5C-C29C-456B-A585-43E30CA71BE9}"/>
           </ac:spMkLst>
         </pc:spChg>
-        <pc:spChg chg="add mod">
-          <ac:chgData name="Rick McAlister" userId="fad37fcb1da1ebec" providerId="LiveId" clId="{E41D39D8-1DDF-4D16-8E53-9090773FDB52}" dt="2021-05-19T03:00:24.780" v="782" actId="1076"/>
+        <pc:spChg chg="add del mod">
+          <ac:chgData name="Rick McAlister" userId="fad37fcb1da1ebec" providerId="LiveId" clId="{E41D39D8-1DDF-4D16-8E53-9090773FDB52}" dt="2021-05-19T18:00:20.854" v="1036" actId="478"/>
           <ac:spMkLst>
             <pc:docMk/>
             <pc:sldMk cId="1809675145" sldId="258"/>
@@ -394,16 +409,24 @@
             <ac:spMk id="37" creationId="{739DAE8C-15D2-4FA1-A9B3-70A6C539A197}"/>
           </ac:spMkLst>
         </pc:spChg>
+        <pc:spChg chg="add del mod">
+          <ac:chgData name="Rick McAlister" userId="fad37fcb1da1ebec" providerId="LiveId" clId="{E41D39D8-1DDF-4D16-8E53-9090773FDB52}" dt="2021-05-19T18:00:22.885" v="1039"/>
+          <ac:spMkLst>
+            <pc:docMk/>
+            <pc:sldMk cId="1809675145" sldId="258"/>
+            <ac:spMk id="37" creationId="{F849DBA2-6494-4479-99C2-AB570ECC3627}"/>
+          </ac:spMkLst>
+        </pc:spChg>
         <pc:spChg chg="add mod">
-          <ac:chgData name="Rick McAlister" userId="fad37fcb1da1ebec" providerId="LiveId" clId="{E41D39D8-1DDF-4D16-8E53-9090773FDB52}" dt="2021-05-19T03:00:24.780" v="782" actId="1076"/>
+          <ac:chgData name="Rick McAlister" userId="fad37fcb1da1ebec" providerId="LiveId" clId="{E41D39D8-1DDF-4D16-8E53-9090773FDB52}" dt="2021-05-19T17:56:04.015" v="1015" actId="688"/>
           <ac:spMkLst>
             <pc:docMk/>
             <pc:sldMk cId="1809675145" sldId="258"/>
             <ac:spMk id="38" creationId="{0F658854-2048-46A1-B71B-865B96BAE1C1}"/>
           </ac:spMkLst>
         </pc:spChg>
-        <pc:spChg chg="add mod">
-          <ac:chgData name="Rick McAlister" userId="fad37fcb1da1ebec" providerId="LiveId" clId="{E41D39D8-1DDF-4D16-8E53-9090773FDB52}" dt="2021-05-19T03:00:29.579" v="783" actId="1076"/>
+        <pc:spChg chg="add del mod">
+          <ac:chgData name="Rick McAlister" userId="fad37fcb1da1ebec" providerId="LiveId" clId="{E41D39D8-1DDF-4D16-8E53-9090773FDB52}" dt="2021-05-19T17:54:55.206" v="982" actId="478"/>
           <ac:spMkLst>
             <pc:docMk/>
             <pc:sldMk cId="1809675145" sldId="258"/>
@@ -411,7 +434,31 @@
           </ac:spMkLst>
         </pc:spChg>
         <pc:spChg chg="add mod">
-          <ac:chgData name="Rick McAlister" userId="fad37fcb1da1ebec" providerId="LiveId" clId="{E41D39D8-1DDF-4D16-8E53-9090773FDB52}" dt="2021-05-19T03:01:08.583" v="786" actId="552"/>
+          <ac:chgData name="Rick McAlister" userId="fad37fcb1da1ebec" providerId="LiveId" clId="{E41D39D8-1DDF-4D16-8E53-9090773FDB52}" dt="2021-05-19T17:59:20.936" v="1034" actId="1076"/>
+          <ac:spMkLst>
+            <pc:docMk/>
+            <pc:sldMk cId="1809675145" sldId="258"/>
+            <ac:spMk id="40" creationId="{D802676C-E991-4864-B570-4AF6499D3B4D}"/>
+          </ac:spMkLst>
+        </pc:spChg>
+        <pc:spChg chg="add mod">
+          <ac:chgData name="Rick McAlister" userId="fad37fcb1da1ebec" providerId="LiveId" clId="{E41D39D8-1DDF-4D16-8E53-9090773FDB52}" dt="2021-05-19T17:56:57.258" v="1016" actId="1076"/>
+          <ac:spMkLst>
+            <pc:docMk/>
+            <pc:sldMk cId="1809675145" sldId="258"/>
+            <ac:spMk id="41" creationId="{717E84D2-553B-40FD-B02B-1F5D3342D0B4}"/>
+          </ac:spMkLst>
+        </pc:spChg>
+        <pc:spChg chg="add mod">
+          <ac:chgData name="Rick McAlister" userId="fad37fcb1da1ebec" providerId="LiveId" clId="{E41D39D8-1DDF-4D16-8E53-9090773FDB52}" dt="2021-05-19T17:56:04.015" v="1015" actId="688"/>
+          <ac:spMkLst>
+            <pc:docMk/>
+            <pc:sldMk cId="1809675145" sldId="258"/>
+            <ac:spMk id="42" creationId="{32BBF9C8-C50E-477A-8D22-67BCF19B880A}"/>
+          </ac:spMkLst>
+        </pc:spChg>
+        <pc:spChg chg="add mod">
+          <ac:chgData name="Rick McAlister" userId="fad37fcb1da1ebec" providerId="LiveId" clId="{E41D39D8-1DDF-4D16-8E53-9090773FDB52}" dt="2021-05-19T17:59:24.922" v="1035" actId="1076"/>
           <ac:spMkLst>
             <pc:docMk/>
             <pc:sldMk cId="1809675145" sldId="258"/>
@@ -419,7 +466,7 @@
           </ac:spMkLst>
         </pc:spChg>
         <pc:spChg chg="mod">
-          <ac:chgData name="Rick McAlister" userId="fad37fcb1da1ebec" providerId="LiveId" clId="{E41D39D8-1DDF-4D16-8E53-9090773FDB52}" dt="2021-05-19T03:00:24.780" v="782" actId="1076"/>
+          <ac:chgData name="Rick McAlister" userId="fad37fcb1da1ebec" providerId="LiveId" clId="{E41D39D8-1DDF-4D16-8E53-9090773FDB52}" dt="2021-05-19T17:55:15.834" v="1011" actId="20577"/>
           <ac:spMkLst>
             <pc:docMk/>
             <pc:sldMk cId="1809675145" sldId="258"/>
@@ -434,6 +481,14 @@
             <ac:spMk id="56" creationId="{40B6D3F8-64A3-4143-B7B1-1877E6E25B4C}"/>
           </ac:spMkLst>
         </pc:spChg>
+        <pc:spChg chg="add mod">
+          <ac:chgData name="Rick McAlister" userId="fad37fcb1da1ebec" providerId="LiveId" clId="{E41D39D8-1DDF-4D16-8E53-9090773FDB52}" dt="2021-05-19T17:56:04.015" v="1015" actId="688"/>
+          <ac:spMkLst>
+            <pc:docMk/>
+            <pc:sldMk cId="1809675145" sldId="258"/>
+            <ac:spMk id="57" creationId="{3C2DD6FE-1026-4186-AE97-5B059498700D}"/>
+          </ac:spMkLst>
+        </pc:spChg>
         <pc:spChg chg="del mod">
           <ac:chgData name="Rick McAlister" userId="fad37fcb1da1ebec" providerId="LiveId" clId="{E41D39D8-1DDF-4D16-8E53-9090773FDB52}" dt="2021-05-19T02:09:54.422" v="244" actId="478"/>
           <ac:spMkLst>
@@ -442,8 +497,32 @@
             <ac:spMk id="57" creationId="{A50E972A-DDB0-4753-8E52-E573D9B1DA9C}"/>
           </ac:spMkLst>
         </pc:spChg>
+        <pc:spChg chg="add mod">
+          <ac:chgData name="Rick McAlister" userId="fad37fcb1da1ebec" providerId="LiveId" clId="{E41D39D8-1DDF-4D16-8E53-9090773FDB52}" dt="2021-05-19T17:57:16.932" v="1018" actId="1076"/>
+          <ac:spMkLst>
+            <pc:docMk/>
+            <pc:sldMk cId="1809675145" sldId="258"/>
+            <ac:spMk id="72" creationId="{C1867D76-ACBF-48D3-9A92-49B1CBBEAF85}"/>
+          </ac:spMkLst>
+        </pc:spChg>
+        <pc:spChg chg="add mod">
+          <ac:chgData name="Rick McAlister" userId="fad37fcb1da1ebec" providerId="LiveId" clId="{E41D39D8-1DDF-4D16-8E53-9090773FDB52}" dt="2021-05-19T17:57:49.284" v="1023" actId="1076"/>
+          <ac:spMkLst>
+            <pc:docMk/>
+            <pc:sldMk cId="1809675145" sldId="258"/>
+            <ac:spMk id="74" creationId="{FC6E7EC6-90CD-4476-878F-90F17503620D}"/>
+          </ac:spMkLst>
+        </pc:spChg>
+        <pc:spChg chg="add mod">
+          <ac:chgData name="Rick McAlister" userId="fad37fcb1da1ebec" providerId="LiveId" clId="{E41D39D8-1DDF-4D16-8E53-9090773FDB52}" dt="2021-05-19T17:57:57.991" v="1025" actId="1076"/>
+          <ac:spMkLst>
+            <pc:docMk/>
+            <pc:sldMk cId="1809675145" sldId="258"/>
+            <ac:spMk id="91" creationId="{2C539BFA-DF16-4800-A8B0-37A22E5570A0}"/>
+          </ac:spMkLst>
+        </pc:spChg>
         <pc:grpChg chg="add mod">
-          <ac:chgData name="Rick McAlister" userId="fad37fcb1da1ebec" providerId="LiveId" clId="{E41D39D8-1DDF-4D16-8E53-9090773FDB52}" dt="2021-05-19T03:01:08.583" v="786" actId="552"/>
+          <ac:chgData name="Rick McAlister" userId="fad37fcb1da1ebec" providerId="LiveId" clId="{E41D39D8-1DDF-4D16-8E53-9090773FDB52}" dt="2021-05-19T17:59:09.353" v="1032" actId="1076"/>
           <ac:grpSpMkLst>
             <pc:docMk/>
             <pc:sldMk cId="1809675145" sldId="258"/>
@@ -451,7 +530,7 @@
           </ac:grpSpMkLst>
         </pc:grpChg>
         <pc:cxnChg chg="mod">
-          <ac:chgData name="Rick McAlister" userId="fad37fcb1da1ebec" providerId="LiveId" clId="{E41D39D8-1DDF-4D16-8E53-9090773FDB52}" dt="2021-05-19T03:00:24.780" v="782" actId="1076"/>
+          <ac:chgData name="Rick McAlister" userId="fad37fcb1da1ebec" providerId="LiveId" clId="{E41D39D8-1DDF-4D16-8E53-9090773FDB52}" dt="2021-05-19T17:56:57.258" v="1016" actId="1076"/>
           <ac:cxnSpMkLst>
             <pc:docMk/>
             <pc:sldMk cId="1809675145" sldId="258"/>
@@ -459,7 +538,7 @@
           </ac:cxnSpMkLst>
         </pc:cxnChg>
         <pc:cxnChg chg="mod">
-          <ac:chgData name="Rick McAlister" userId="fad37fcb1da1ebec" providerId="LiveId" clId="{E41D39D8-1DDF-4D16-8E53-9090773FDB52}" dt="2021-05-19T03:00:24.780" v="782" actId="1076"/>
+          <ac:chgData name="Rick McAlister" userId="fad37fcb1da1ebec" providerId="LiveId" clId="{E41D39D8-1DDF-4D16-8E53-9090773FDB52}" dt="2021-05-19T17:56:57.258" v="1016" actId="1076"/>
           <ac:cxnSpMkLst>
             <pc:docMk/>
             <pc:sldMk cId="1809675145" sldId="258"/>
@@ -467,7 +546,7 @@
           </ac:cxnSpMkLst>
         </pc:cxnChg>
         <pc:cxnChg chg="mod">
-          <ac:chgData name="Rick McAlister" userId="fad37fcb1da1ebec" providerId="LiveId" clId="{E41D39D8-1DDF-4D16-8E53-9090773FDB52}" dt="2021-05-19T03:00:24.780" v="782" actId="1076"/>
+          <ac:chgData name="Rick McAlister" userId="fad37fcb1da1ebec" providerId="LiveId" clId="{E41D39D8-1DDF-4D16-8E53-9090773FDB52}" dt="2021-05-19T17:56:04.015" v="1015" actId="688"/>
           <ac:cxnSpMkLst>
             <pc:docMk/>
             <pc:sldMk cId="1809675145" sldId="258"/>
@@ -475,7 +554,7 @@
           </ac:cxnSpMkLst>
         </pc:cxnChg>
         <pc:cxnChg chg="mod">
-          <ac:chgData name="Rick McAlister" userId="fad37fcb1da1ebec" providerId="LiveId" clId="{E41D39D8-1DDF-4D16-8E53-9090773FDB52}" dt="2021-05-19T03:00:24.780" v="782" actId="1076"/>
+          <ac:chgData name="Rick McAlister" userId="fad37fcb1da1ebec" providerId="LiveId" clId="{E41D39D8-1DDF-4D16-8E53-9090773FDB52}" dt="2021-05-19T17:57:16.932" v="1018" actId="1076"/>
           <ac:cxnSpMkLst>
             <pc:docMk/>
             <pc:sldMk cId="1809675145" sldId="258"/>
@@ -483,7 +562,7 @@
           </ac:cxnSpMkLst>
         </pc:cxnChg>
         <pc:cxnChg chg="add mod">
-          <ac:chgData name="Rick McAlister" userId="fad37fcb1da1ebec" providerId="LiveId" clId="{E41D39D8-1DDF-4D16-8E53-9090773FDB52}" dt="2021-05-19T03:00:24.780" v="782" actId="1076"/>
+          <ac:chgData name="Rick McAlister" userId="fad37fcb1da1ebec" providerId="LiveId" clId="{E41D39D8-1DDF-4D16-8E53-9090773FDB52}" dt="2021-05-19T17:56:04.015" v="1015" actId="688"/>
           <ac:cxnSpMkLst>
             <pc:docMk/>
             <pc:sldMk cId="1809675145" sldId="258"/>
@@ -491,11 +570,19 @@
           </ac:cxnSpMkLst>
         </pc:cxnChg>
         <pc:cxnChg chg="add mod">
-          <ac:chgData name="Rick McAlister" userId="fad37fcb1da1ebec" providerId="LiveId" clId="{E41D39D8-1DDF-4D16-8E53-9090773FDB52}" dt="2021-05-19T03:00:24.780" v="782" actId="1076"/>
+          <ac:chgData name="Rick McAlister" userId="fad37fcb1da1ebec" providerId="LiveId" clId="{E41D39D8-1DDF-4D16-8E53-9090773FDB52}" dt="2021-05-19T17:56:57.258" v="1016" actId="1076"/>
           <ac:cxnSpMkLst>
             <pc:docMk/>
             <pc:sldMk cId="1809675145" sldId="258"/>
             <ac:cxnSpMk id="43" creationId="{186A0791-DC54-495F-963C-DB4ECA7A764E}"/>
+          </ac:cxnSpMkLst>
+        </pc:cxnChg>
+        <pc:cxnChg chg="add mod">
+          <ac:chgData name="Rick McAlister" userId="fad37fcb1da1ebec" providerId="LiveId" clId="{E41D39D8-1DDF-4D16-8E53-9090773FDB52}" dt="2021-05-19T17:57:49.284" v="1023" actId="1076"/>
+          <ac:cxnSpMkLst>
+            <pc:docMk/>
+            <pc:sldMk cId="1809675145" sldId="258"/>
+            <ac:cxnSpMk id="75" creationId="{7D7E8D98-47B2-4C95-B150-2BAA41117295}"/>
           </ac:cxnSpMkLst>
         </pc:cxnChg>
       </pc:sldChg>
@@ -1552,7 +1639,7 @@
           <a:p>
             <a:fld id="{F3FFCF3C-4A0D-4637-8D0F-A75E6B068A0D}" type="datetimeFigureOut">
               <a:rPr lang="en-US" smtClean="0"/>
-              <a:t>5/18/2021</a:t>
+              <a:t>5/19/2021</a:t>
             </a:fld>
             <a:endParaRPr lang="en-US"/>
           </a:p>
@@ -1750,7 +1837,7 @@
           <a:p>
             <a:fld id="{F3FFCF3C-4A0D-4637-8D0F-A75E6B068A0D}" type="datetimeFigureOut">
               <a:rPr lang="en-US" smtClean="0"/>
-              <a:t>5/18/2021</a:t>
+              <a:t>5/19/2021</a:t>
             </a:fld>
             <a:endParaRPr lang="en-US"/>
           </a:p>
@@ -1958,7 +2045,7 @@
           <a:p>
             <a:fld id="{F3FFCF3C-4A0D-4637-8D0F-A75E6B068A0D}" type="datetimeFigureOut">
               <a:rPr lang="en-US" smtClean="0"/>
-              <a:t>5/18/2021</a:t>
+              <a:t>5/19/2021</a:t>
             </a:fld>
             <a:endParaRPr lang="en-US"/>
           </a:p>
@@ -2156,7 +2243,7 @@
           <a:p>
             <a:fld id="{F3FFCF3C-4A0D-4637-8D0F-A75E6B068A0D}" type="datetimeFigureOut">
               <a:rPr lang="en-US" smtClean="0"/>
-              <a:t>5/18/2021</a:t>
+              <a:t>5/19/2021</a:t>
             </a:fld>
             <a:endParaRPr lang="en-US"/>
           </a:p>
@@ -2431,7 +2518,7 @@
           <a:p>
             <a:fld id="{F3FFCF3C-4A0D-4637-8D0F-A75E6B068A0D}" type="datetimeFigureOut">
               <a:rPr lang="en-US" smtClean="0"/>
-              <a:t>5/18/2021</a:t>
+              <a:t>5/19/2021</a:t>
             </a:fld>
             <a:endParaRPr lang="en-US"/>
           </a:p>
@@ -2696,7 +2783,7 @@
           <a:p>
             <a:fld id="{F3FFCF3C-4A0D-4637-8D0F-A75E6B068A0D}" type="datetimeFigureOut">
               <a:rPr lang="en-US" smtClean="0"/>
-              <a:t>5/18/2021</a:t>
+              <a:t>5/19/2021</a:t>
             </a:fld>
             <a:endParaRPr lang="en-US"/>
           </a:p>
@@ -3108,7 +3195,7 @@
           <a:p>
             <a:fld id="{F3FFCF3C-4A0D-4637-8D0F-A75E6B068A0D}" type="datetimeFigureOut">
               <a:rPr lang="en-US" smtClean="0"/>
-              <a:t>5/18/2021</a:t>
+              <a:t>5/19/2021</a:t>
             </a:fld>
             <a:endParaRPr lang="en-US"/>
           </a:p>
@@ -3249,7 +3336,7 @@
           <a:p>
             <a:fld id="{F3FFCF3C-4A0D-4637-8D0F-A75E6B068A0D}" type="datetimeFigureOut">
               <a:rPr lang="en-US" smtClean="0"/>
-              <a:t>5/18/2021</a:t>
+              <a:t>5/19/2021</a:t>
             </a:fld>
             <a:endParaRPr lang="en-US"/>
           </a:p>
@@ -3362,7 +3449,7 @@
           <a:p>
             <a:fld id="{F3FFCF3C-4A0D-4637-8D0F-A75E6B068A0D}" type="datetimeFigureOut">
               <a:rPr lang="en-US" smtClean="0"/>
-              <a:t>5/18/2021</a:t>
+              <a:t>5/19/2021</a:t>
             </a:fld>
             <a:endParaRPr lang="en-US"/>
           </a:p>
@@ -3673,7 +3760,7 @@
           <a:p>
             <a:fld id="{F3FFCF3C-4A0D-4637-8D0F-A75E6B068A0D}" type="datetimeFigureOut">
               <a:rPr lang="en-US" smtClean="0"/>
-              <a:t>5/18/2021</a:t>
+              <a:t>5/19/2021</a:t>
             </a:fld>
             <a:endParaRPr lang="en-US"/>
           </a:p>
@@ -3961,7 +4048,7 @@
           <a:p>
             <a:fld id="{F3FFCF3C-4A0D-4637-8D0F-A75E6B068A0D}" type="datetimeFigureOut">
               <a:rPr lang="en-US" smtClean="0"/>
-              <a:t>5/18/2021</a:t>
+              <a:t>5/19/2021</a:t>
             </a:fld>
             <a:endParaRPr lang="en-US"/>
           </a:p>
@@ -4202,7 +4289,7 @@
           <a:p>
             <a:fld id="{F3FFCF3C-4A0D-4637-8D0F-A75E6B068A0D}" type="datetimeFigureOut">
               <a:rPr lang="en-US" smtClean="0"/>
-              <a:t>5/18/2021</a:t>
+              <a:t>5/19/2021</a:t>
             </a:fld>
             <a:endParaRPr lang="en-US"/>
           </a:p>
@@ -6955,7 +7042,7 @@
         </p:nvSpPr>
         <p:spPr>
           <a:xfrm>
-            <a:off x="8587802" y="560571"/>
+            <a:off x="8584228" y="587743"/>
             <a:ext cx="3200400" cy="3100388"/>
           </a:xfrm>
           <a:prstGeom prst="ellipse">
@@ -7004,13 +7091,15 @@
           </p:cNvPr>
           <p:cNvCxnSpPr>
             <a:cxnSpLocks/>
+            <a:stCxn id="57" idx="2"/>
+            <a:endCxn id="41" idx="5"/>
           </p:cNvCxnSpPr>
           <p:nvPr/>
         </p:nvCxnSpPr>
         <p:spPr>
-          <a:xfrm flipH="1">
-            <a:off x="3335041" y="2062760"/>
-            <a:ext cx="6843712" cy="48241"/>
+          <a:xfrm flipH="1" flipV="1">
+            <a:off x="4903907" y="1346094"/>
+            <a:ext cx="5208395" cy="686138"/>
           </a:xfrm>
           <a:prstGeom prst="line">
             <a:avLst/>
@@ -7022,8 +7111,8 @@
                 <a:lumOff val="5000"/>
               </a:schemeClr>
             </a:solidFill>
-            <a:headEnd type="oval" w="med" len="lg"/>
-            <a:tailEnd type="oval"/>
+            <a:headEnd type="none" w="med" len="med"/>
+            <a:tailEnd type="none" w="med" len="med"/>
           </a:ln>
         </p:spPr>
         <p:style>
@@ -7052,13 +7141,15 @@
           </p:cNvPr>
           <p:cNvCxnSpPr>
             <a:cxnSpLocks/>
+            <a:stCxn id="42" idx="2"/>
+            <a:endCxn id="41" idx="6"/>
           </p:cNvCxnSpPr>
           <p:nvPr/>
         </p:nvCxnSpPr>
         <p:spPr>
-          <a:xfrm flipH="1">
-            <a:off x="3378866" y="1138767"/>
-            <a:ext cx="5526599" cy="971998"/>
+          <a:xfrm flipH="1" flipV="1">
+            <a:off x="4919479" y="1304081"/>
+            <a:ext cx="3820726" cy="67377"/>
           </a:xfrm>
           <a:prstGeom prst="line">
             <a:avLst/>
@@ -7070,8 +7161,8 @@
                 <a:lumOff val="5000"/>
               </a:schemeClr>
             </a:solidFill>
-            <a:headEnd type="oval" w="med" len="lg"/>
-            <a:tailEnd type="oval"/>
+            <a:headEnd type="none" w="med" len="med"/>
+            <a:tailEnd type="none" w="med" len="med"/>
           </a:ln>
         </p:spPr>
         <p:style>
@@ -7100,13 +7191,15 @@
           </p:cNvPr>
           <p:cNvCxnSpPr>
             <a:cxnSpLocks/>
+            <a:stCxn id="42" idx="6"/>
+            <a:endCxn id="57" idx="1"/>
           </p:cNvCxnSpPr>
           <p:nvPr/>
         </p:nvCxnSpPr>
         <p:spPr>
           <a:xfrm>
-            <a:off x="8942776" y="1143847"/>
-            <a:ext cx="1241652" cy="893425"/>
+            <a:off x="8846535" y="1371458"/>
+            <a:ext cx="1281339" cy="618761"/>
           </a:xfrm>
           <a:prstGeom prst="line">
             <a:avLst/>
@@ -7118,8 +7211,8 @@
                 <a:lumOff val="5000"/>
               </a:schemeClr>
             </a:solidFill>
-            <a:headEnd type="oval" w="med" len="lg"/>
-            <a:tailEnd type="oval"/>
+            <a:headEnd type="none" w="med" len="med"/>
+            <a:tailEnd type="none" w="med" len="med"/>
           </a:ln>
         </p:spPr>
         <p:style>
@@ -7148,13 +7241,15 @@
           </p:cNvPr>
           <p:cNvCxnSpPr>
             <a:cxnSpLocks/>
+            <a:stCxn id="42" idx="4"/>
+            <a:endCxn id="72" idx="0"/>
           </p:cNvCxnSpPr>
           <p:nvPr/>
         </p:nvCxnSpPr>
         <p:spPr>
-          <a:xfrm>
-            <a:off x="8943332" y="1141502"/>
-            <a:ext cx="5729" cy="941430"/>
+          <a:xfrm flipH="1">
+            <a:off x="8749227" y="1430873"/>
+            <a:ext cx="44143" cy="353717"/>
           </a:xfrm>
           <a:prstGeom prst="line">
             <a:avLst/>
@@ -7166,8 +7261,8 @@
                 <a:lumOff val="5000"/>
               </a:schemeClr>
             </a:solidFill>
-            <a:headEnd type="oval" w="med" len="lg"/>
-            <a:tailEnd type="oval"/>
+            <a:headEnd type="none" w="med" len="med"/>
+            <a:tailEnd type="none" w="med" len="med"/>
           </a:ln>
         </p:spPr>
         <p:style>
@@ -7198,9 +7293,9 @@
           <p:nvPr/>
         </p:nvSpPr>
         <p:spPr>
-          <a:xfrm>
-            <a:off x="8961701" y="1881487"/>
-            <a:ext cx="170220" cy="186445"/>
+          <a:xfrm rot="510549">
+            <a:off x="8763532" y="1735243"/>
+            <a:ext cx="90819" cy="111581"/>
           </a:xfrm>
           <a:prstGeom prst="rect">
             <a:avLst/>
@@ -7235,96 +7330,6 @@
       </p:sp>
       <p:sp>
         <p:nvSpPr>
-          <p:cNvPr id="20" name="Arc 19">
-            <a:extLst>
-              <a:ext uri="{FF2B5EF4-FFF2-40B4-BE49-F238E27FC236}">
-                <a16:creationId xmlns:a16="http://schemas.microsoft.com/office/drawing/2014/main" id="{F41EBB94-8AF1-4AD5-BCEF-A3B5B172014D}"/>
-              </a:ext>
-            </a:extLst>
-          </p:cNvPr>
-          <p:cNvSpPr/>
-          <p:nvPr/>
-        </p:nvSpPr>
-        <p:spPr>
-          <a:xfrm rot="410400">
-            <a:off x="4474893" y="1904190"/>
-            <a:ext cx="60311" cy="453976"/>
-          </a:xfrm>
-          <a:prstGeom prst="arc">
-            <a:avLst/>
-          </a:prstGeom>
-          <a:ln w="25400"/>
-        </p:spPr>
-        <p:style>
-          <a:lnRef idx="1">
-            <a:schemeClr val="accent1"/>
-          </a:lnRef>
-          <a:fillRef idx="0">
-            <a:schemeClr val="accent1"/>
-          </a:fillRef>
-          <a:effectRef idx="0">
-            <a:schemeClr val="accent1"/>
-          </a:effectRef>
-          <a:fontRef idx="minor">
-            <a:schemeClr val="tx1"/>
-          </a:fontRef>
-        </p:style>
-        <p:txBody>
-          <a:bodyPr rtlCol="0" anchor="ctr"/>
-          <a:lstStyle/>
-          <a:p>
-            <a:pPr algn="ctr"/>
-            <a:endParaRPr lang="en-US"/>
-          </a:p>
-        </p:txBody>
-      </p:sp>
-      <p:sp>
-        <p:nvSpPr>
-          <p:cNvPr id="21" name="Arc 20">
-            <a:extLst>
-              <a:ext uri="{FF2B5EF4-FFF2-40B4-BE49-F238E27FC236}">
-                <a16:creationId xmlns:a16="http://schemas.microsoft.com/office/drawing/2014/main" id="{B67B56BA-4E54-4906-A424-88860CFFE9F2}"/>
-              </a:ext>
-            </a:extLst>
-          </p:cNvPr>
-          <p:cNvSpPr/>
-          <p:nvPr/>
-        </p:nvSpPr>
-        <p:spPr>
-          <a:xfrm rot="12576518">
-            <a:off x="9840984" y="1582104"/>
-            <a:ext cx="95036" cy="489113"/>
-          </a:xfrm>
-          <a:prstGeom prst="arc">
-            <a:avLst/>
-          </a:prstGeom>
-          <a:ln w="25400"/>
-        </p:spPr>
-        <p:style>
-          <a:lnRef idx="1">
-            <a:schemeClr val="accent1"/>
-          </a:lnRef>
-          <a:fillRef idx="0">
-            <a:schemeClr val="accent1"/>
-          </a:fillRef>
-          <a:effectRef idx="0">
-            <a:schemeClr val="accent1"/>
-          </a:effectRef>
-          <a:fontRef idx="minor">
-            <a:schemeClr val="tx1"/>
-          </a:fontRef>
-        </p:style>
-        <p:txBody>
-          <a:bodyPr rtlCol="0" anchor="ctr"/>
-          <a:lstStyle/>
-          <a:p>
-            <a:pPr algn="ctr"/>
-            <a:endParaRPr lang="en-US"/>
-          </a:p>
-        </p:txBody>
-      </p:sp>
-      <p:sp>
-        <p:nvSpPr>
           <p:cNvPr id="22" name="TextBox 21">
             <a:extLst>
               <a:ext uri="{FF2B5EF4-FFF2-40B4-BE49-F238E27FC236}">
@@ -7337,7 +7342,7 @@
         </p:nvSpPr>
         <p:spPr>
           <a:xfrm flipH="1">
-            <a:off x="9531225" y="1242885"/>
+            <a:off x="9733438" y="1186974"/>
             <a:ext cx="432029" cy="369332"/>
           </a:xfrm>
           <a:prstGeom prst="rect">
@@ -7376,7 +7381,7 @@
         </p:nvSpPr>
         <p:spPr>
           <a:xfrm flipH="1">
-            <a:off x="10157185" y="2041675"/>
+            <a:off x="10127874" y="2032232"/>
             <a:ext cx="514162" cy="369332"/>
           </a:xfrm>
           <a:prstGeom prst="rect">
@@ -7411,7 +7416,7 @@
         </p:nvSpPr>
         <p:spPr>
           <a:xfrm flipH="1">
-            <a:off x="2887480" y="1902214"/>
+            <a:off x="4560711" y="1290089"/>
             <a:ext cx="335410" cy="369332"/>
           </a:xfrm>
           <a:prstGeom prst="rect">
@@ -7446,8 +7451,8 @@
         </p:nvSpPr>
         <p:spPr>
           <a:xfrm flipH="1">
-            <a:off x="7076393" y="519346"/>
-            <a:ext cx="1924784" cy="369332"/>
+            <a:off x="564983" y="266525"/>
+            <a:ext cx="2766045" cy="1200329"/>
           </a:xfrm>
           <a:prstGeom prst="rect">
             <a:avLst/>
@@ -7462,7 +7467,25 @@
           <a:p>
             <a:r>
               <a:rPr lang="en-US" dirty="0"/>
-              <a:t>MPC Observatory</a:t>
+              <a:t>M:	MPC Observatory</a:t>
+            </a:r>
+          </a:p>
+          <a:p>
+            <a:r>
+              <a:rPr lang="en-US" dirty="0"/>
+              <a:t>S: 	Site</a:t>
+            </a:r>
+          </a:p>
+          <a:p>
+            <a:r>
+              <a:rPr lang="en-US" dirty="0"/>
+              <a:t>N:	NEO</a:t>
+            </a:r>
+          </a:p>
+          <a:p>
+            <a:r>
+              <a:rPr lang="en-US" dirty="0"/>
+              <a:t>C:	Center of Earth</a:t>
             </a:r>
           </a:p>
         </p:txBody>
@@ -7481,7 +7504,7 @@
         </p:nvSpPr>
         <p:spPr>
           <a:xfrm flipH="1">
-            <a:off x="8678911" y="2064311"/>
+            <a:off x="8632732" y="1859820"/>
             <a:ext cx="263865" cy="369332"/>
           </a:xfrm>
           <a:prstGeom prst="rect">
@@ -7502,8 +7525,8 @@
           </a:p>
         </p:txBody>
       </p:sp>
-      <mc:AlternateContent xmlns:mc="http://schemas.openxmlformats.org/markup-compatibility/2006">
-        <mc:Choice xmlns:a14="http://schemas.microsoft.com/office/drawing/2010/main" Requires="a14">
+      <mc:AlternateContent xmlns:mc="http://schemas.openxmlformats.org/markup-compatibility/2006" xmlns:a14="http://schemas.microsoft.com/office/drawing/2010/main">
+        <mc:Choice Requires="a14">
           <p:sp>
             <p:nvSpPr>
               <p:cNvPr id="2" name="TextBox 1">
@@ -7518,7 +7541,7 @@
             </p:nvSpPr>
             <p:spPr>
               <a:xfrm>
-                <a:off x="564984" y="3243016"/>
+                <a:off x="523419" y="2672152"/>
                 <a:ext cx="4109971" cy="276999"/>
               </a:xfrm>
               <a:prstGeom prst="rect">
@@ -7532,6 +7555,7 @@
               </a:bodyPr>
               <a:lstStyle/>
               <a:p>
+                <a:pPr/>
                 <a14:m>
                   <m:oMathPara xmlns:m="http://schemas.openxmlformats.org/officeDocument/2006/math">
                     <m:oMathParaPr>
@@ -7594,7 +7618,7 @@
             </p:txBody>
           </p:sp>
         </mc:Choice>
-        <mc:Fallback>
+        <mc:Fallback xmlns="">
           <p:sp>
             <p:nvSpPr>
               <p:cNvPr id="2" name="TextBox 1">
@@ -7611,7 +7635,7 @@
             </p:nvSpPr>
             <p:spPr>
               <a:xfrm>
-                <a:off x="564984" y="3243016"/>
+                <a:off x="523419" y="2672152"/>
                 <a:ext cx="4109971" cy="276999"/>
               </a:xfrm>
               <a:prstGeom prst="rect">
@@ -7620,7 +7644,7 @@
               <a:blipFill>
                 <a:blip r:embed="rId2"/>
                 <a:stretch>
-                  <a:fillRect b="-15556"/>
+                  <a:fillRect b="-13043"/>
                 </a:stretch>
               </a:blipFill>
             </p:spPr>
@@ -7653,7 +7677,7 @@
         </p:nvSpPr>
         <p:spPr>
           <a:xfrm>
-            <a:off x="9414552" y="665546"/>
+            <a:off x="9300784" y="780471"/>
             <a:ext cx="106330" cy="118830"/>
           </a:xfrm>
           <a:prstGeom prst="ellipse">
@@ -7685,8 +7709,8 @@
           </a:p>
         </p:txBody>
       </p:sp>
-      <mc:AlternateContent xmlns:mc="http://schemas.openxmlformats.org/markup-compatibility/2006">
-        <mc:Choice xmlns:a14="http://schemas.microsoft.com/office/drawing/2010/main" Requires="a14">
+      <mc:AlternateContent xmlns:mc="http://schemas.openxmlformats.org/markup-compatibility/2006" xmlns:a14="http://schemas.microsoft.com/office/drawing/2010/main">
+        <mc:Choice Requires="a14">
           <p:sp>
             <p:nvSpPr>
               <p:cNvPr id="5" name="TextBox 4">
@@ -7701,8 +7725,8 @@
             </p:nvSpPr>
             <p:spPr>
               <a:xfrm>
-                <a:off x="564984" y="3656035"/>
-                <a:ext cx="3111365" cy="276999"/>
+                <a:off x="587481" y="3058499"/>
+                <a:ext cx="3177921" cy="276999"/>
               </a:xfrm>
               <a:prstGeom prst="rect">
                 <a:avLst/>
@@ -7715,6 +7739,7 @@
               </a:bodyPr>
               <a:lstStyle/>
               <a:p>
+                <a:pPr/>
                 <a14:m>
                   <m:oMathPara xmlns:m="http://schemas.openxmlformats.org/officeDocument/2006/math">
                     <m:oMathParaPr>
@@ -7780,10 +7805,11 @@
                             <m:t>∆</m:t>
                           </m:r>
                           <m:r>
-                            <a:rPr lang="en-US" i="1" dirty="0" err="1">
+                            <a:rPr lang="en-US" b="0" i="1" dirty="0" smtClean="0">
                               <a:latin typeface="Cambria Math" panose="02040503050406030204" pitchFamily="18" charset="0"/>
+                              <a:ea typeface="Cambria Math" panose="02040503050406030204" pitchFamily="18" charset="0"/>
                             </a:rPr>
-                            <m:t>𝐿𝑎𝑡</m:t>
+                            <m:t>𝑀𝐶𝑁</m:t>
                           </m:r>
                         </m:e>
                       </m:d>
@@ -7795,7 +7821,7 @@
             </p:txBody>
           </p:sp>
         </mc:Choice>
-        <mc:Fallback>
+        <mc:Fallback xmlns="">
           <p:sp>
             <p:nvSpPr>
               <p:cNvPr id="5" name="TextBox 4">
@@ -7812,8 +7838,8 @@
             </p:nvSpPr>
             <p:spPr>
               <a:xfrm>
-                <a:off x="564984" y="3656035"/>
-                <a:ext cx="3111365" cy="276999"/>
+                <a:off x="587481" y="3058499"/>
+                <a:ext cx="3177921" cy="276999"/>
               </a:xfrm>
               <a:prstGeom prst="rect">
                 <a:avLst/>
@@ -7821,7 +7847,7 @@
               <a:blipFill>
                 <a:blip r:embed="rId3"/>
                 <a:stretch>
-                  <a:fillRect b="-15556"/>
+                  <a:fillRect l="-1341" b="-15556"/>
                 </a:stretch>
               </a:blipFill>
             </p:spPr>
@@ -7840,8 +7866,8 @@
           </p:sp>
         </mc:Fallback>
       </mc:AlternateContent>
-      <mc:AlternateContent xmlns:mc="http://schemas.openxmlformats.org/markup-compatibility/2006">
-        <mc:Choice xmlns:a14="http://schemas.microsoft.com/office/drawing/2010/main" Requires="a14">
+      <mc:AlternateContent xmlns:mc="http://schemas.openxmlformats.org/markup-compatibility/2006" xmlns:a14="http://schemas.microsoft.com/office/drawing/2010/main">
+        <mc:Choice Requires="a14">
           <p:sp>
             <p:nvSpPr>
               <p:cNvPr id="8" name="TextBox 7">
@@ -7856,8 +7882,8 @@
             </p:nvSpPr>
             <p:spPr>
               <a:xfrm>
-                <a:off x="564984" y="2829997"/>
-                <a:ext cx="2220864" cy="276999"/>
+                <a:off x="587481" y="2230671"/>
+                <a:ext cx="2330703" cy="276999"/>
               </a:xfrm>
               <a:prstGeom prst="rect">
                 <a:avLst/>
@@ -7870,6 +7896,7 @@
               </a:bodyPr>
               <a:lstStyle/>
               <a:p>
+                <a:pPr/>
                 <a14:m>
                   <m:oMathPara xmlns:m="http://schemas.openxmlformats.org/officeDocument/2006/math">
                     <m:oMathParaPr>
@@ -7887,7 +7914,7 @@
                         <a:rPr lang="en-US" b="0" i="1" smtClean="0">
                           <a:latin typeface="Cambria Math" panose="02040503050406030204" pitchFamily="18" charset="0"/>
                         </a:rPr>
-                        <m:t>𝐿𝑎𝑡</m:t>
+                        <m:t>𝑀𝐶𝑁</m:t>
                       </m:r>
                       <m:r>
                         <a:rPr lang="en-US" b="0" i="1" smtClean="0">
@@ -7959,7 +7986,7 @@
             </p:txBody>
           </p:sp>
         </mc:Choice>
-        <mc:Fallback>
+        <mc:Fallback xmlns="">
           <p:sp>
             <p:nvSpPr>
               <p:cNvPr id="8" name="TextBox 7">
@@ -7976,8 +8003,8 @@
             </p:nvSpPr>
             <p:spPr>
               <a:xfrm>
-                <a:off x="564984" y="2829997"/>
-                <a:ext cx="2220864" cy="276999"/>
+                <a:off x="587481" y="2230671"/>
+                <a:ext cx="2330703" cy="276999"/>
               </a:xfrm>
               <a:prstGeom prst="rect">
                 <a:avLst/>
@@ -7985,7 +8012,7 @@
               <a:blipFill>
                 <a:blip r:embed="rId4"/>
                 <a:stretch>
-                  <a:fillRect l="-1099" b="-15217"/>
+                  <a:fillRect l="-1828" r="-261" b="-15556"/>
                 </a:stretch>
               </a:blipFill>
             </p:spPr>
@@ -8004,8 +8031,8 @@
           </p:sp>
         </mc:Fallback>
       </mc:AlternateContent>
-      <mc:AlternateContent xmlns:mc="http://schemas.openxmlformats.org/markup-compatibility/2006">
-        <mc:Choice xmlns:a14="http://schemas.microsoft.com/office/drawing/2010/main" Requires="a14">
+      <mc:AlternateContent xmlns:mc="http://schemas.openxmlformats.org/markup-compatibility/2006" xmlns:a14="http://schemas.microsoft.com/office/drawing/2010/main">
+        <mc:Choice Requires="a14">
           <p:sp>
             <p:nvSpPr>
               <p:cNvPr id="9" name="TextBox 8">
@@ -8020,8 +8047,8 @@
             </p:nvSpPr>
             <p:spPr>
               <a:xfrm>
-                <a:off x="618423" y="2433643"/>
-                <a:ext cx="2220864" cy="276999"/>
+                <a:off x="640920" y="1834317"/>
+                <a:ext cx="2559938" cy="276999"/>
               </a:xfrm>
               <a:prstGeom prst="rect">
                 <a:avLst/>
@@ -8047,7 +8074,7 @@
                       <a:rPr lang="en-US" b="0" i="1" smtClean="0">
                         <a:latin typeface="Cambria Math" panose="02040503050406030204" pitchFamily="18" charset="0"/>
                       </a:rPr>
-                      <m:t>𝐷𝑒𝑐</m:t>
+                      <m:t>𝑀𝑁𝐶</m:t>
                     </m:r>
                     <m:r>
                       <a:rPr lang="en-US" b="0" i="1" smtClean="0">
@@ -8121,7 +8148,7 @@
             </p:txBody>
           </p:sp>
         </mc:Choice>
-        <mc:Fallback>
+        <mc:Fallback xmlns="">
           <p:sp>
             <p:nvSpPr>
               <p:cNvPr id="9" name="TextBox 8">
@@ -8138,8 +8165,8 @@
             </p:nvSpPr>
             <p:spPr>
               <a:xfrm>
-                <a:off x="618423" y="2433643"/>
-                <a:ext cx="2220864" cy="276999"/>
+                <a:off x="640920" y="1834317"/>
+                <a:ext cx="2559938" cy="276999"/>
               </a:xfrm>
               <a:prstGeom prst="rect">
                 <a:avLst/>
@@ -8147,7 +8174,7 @@
               <a:blipFill>
                 <a:blip r:embed="rId5"/>
                 <a:stretch>
-                  <a:fillRect l="-3562" b="-15217"/>
+                  <a:fillRect l="-3095" b="-15556"/>
                 </a:stretch>
               </a:blipFill>
             </p:spPr>
@@ -8166,212 +8193,8 @@
           </p:sp>
         </mc:Fallback>
       </mc:AlternateContent>
-      <mc:AlternateContent xmlns:mc="http://schemas.openxmlformats.org/markup-compatibility/2006">
-        <mc:Choice xmlns:a14="http://schemas.microsoft.com/office/drawing/2010/main" Requires="a14">
-          <p:sp>
-            <p:nvSpPr>
-              <p:cNvPr id="30" name="TextBox 29">
-                <a:extLst>
-                  <a:ext uri="{FF2B5EF4-FFF2-40B4-BE49-F238E27FC236}">
-                    <a16:creationId xmlns:a16="http://schemas.microsoft.com/office/drawing/2014/main" id="{2DAFECA7-1182-4987-BBD2-815A8824D29F}"/>
-                  </a:ext>
-                </a:extLst>
-              </p:cNvPr>
-              <p:cNvSpPr txBox="1"/>
-              <p:nvPr/>
-            </p:nvSpPr>
-            <p:spPr>
-              <a:xfrm>
-                <a:off x="4717999" y="1877858"/>
-                <a:ext cx="384785" cy="184666"/>
-              </a:xfrm>
-              <a:prstGeom prst="rect">
-                <a:avLst/>
-              </a:prstGeom>
-              <a:noFill/>
-            </p:spPr>
-            <p:txBody>
-              <a:bodyPr wrap="none" lIns="0" tIns="0" rIns="0" bIns="0" rtlCol="0">
-                <a:spAutoFit/>
-              </a:bodyPr>
-              <a:lstStyle/>
-              <a:p>
-                <a14:m>
-                  <m:oMathPara xmlns:m="http://schemas.openxmlformats.org/officeDocument/2006/math">
-                    <m:oMathParaPr>
-                      <m:jc m:val="centerGroup"/>
-                    </m:oMathParaPr>
-                    <m:oMath xmlns:m="http://schemas.openxmlformats.org/officeDocument/2006/math">
-                      <m:r>
-                        <a:rPr lang="en-US" sz="1200" b="0" i="1" smtClean="0">
-                          <a:latin typeface="Cambria Math" panose="02040503050406030204" pitchFamily="18" charset="0"/>
-                          <a:ea typeface="Cambria Math" panose="02040503050406030204" pitchFamily="18" charset="0"/>
-                        </a:rPr>
-                        <m:t>∆</m:t>
-                      </m:r>
-                      <m:r>
-                        <a:rPr lang="en-US" sz="1200" b="0" i="1" smtClean="0">
-                          <a:latin typeface="Cambria Math" panose="02040503050406030204" pitchFamily="18" charset="0"/>
-                        </a:rPr>
-                        <m:t>𝐷𝑒𝑐</m:t>
-                      </m:r>
-                    </m:oMath>
-                  </m:oMathPara>
-                </a14:m>
-                <a:endParaRPr lang="en-US" sz="1200" dirty="0"/>
-              </a:p>
-            </p:txBody>
-          </p:sp>
-        </mc:Choice>
-        <mc:Fallback>
-          <p:sp>
-            <p:nvSpPr>
-              <p:cNvPr id="30" name="TextBox 29">
-                <a:extLst>
-                  <a:ext uri="{FF2B5EF4-FFF2-40B4-BE49-F238E27FC236}">
-                    <a16:creationId xmlns:a16="http://schemas.microsoft.com/office/drawing/2014/main" id="{2DAFECA7-1182-4987-BBD2-815A8824D29F}"/>
-                  </a:ext>
-                </a:extLst>
-              </p:cNvPr>
-              <p:cNvSpPr txBox="1">
-                <a:spLocks noRot="1" noChangeAspect="1" noMove="1" noResize="1" noEditPoints="1" noAdjustHandles="1" noChangeArrowheads="1" noChangeShapeType="1" noTextEdit="1"/>
-              </p:cNvSpPr>
-              <p:nvPr/>
-            </p:nvSpPr>
-            <p:spPr>
-              <a:xfrm>
-                <a:off x="4717999" y="1877858"/>
-                <a:ext cx="384785" cy="184666"/>
-              </a:xfrm>
-              <a:prstGeom prst="rect">
-                <a:avLst/>
-              </a:prstGeom>
-              <a:blipFill>
-                <a:blip r:embed="rId6"/>
-                <a:stretch>
-                  <a:fillRect l="-9524" r="-7937" b="-6667"/>
-                </a:stretch>
-              </a:blipFill>
-            </p:spPr>
-            <p:txBody>
-              <a:bodyPr/>
-              <a:lstStyle/>
-              <a:p>
-                <a:r>
-                  <a:rPr lang="en-US">
-                    <a:noFill/>
-                  </a:rPr>
-                  <a:t> </a:t>
-                </a:r>
-              </a:p>
-            </p:txBody>
-          </p:sp>
-        </mc:Fallback>
-      </mc:AlternateContent>
-      <mc:AlternateContent xmlns:mc="http://schemas.openxmlformats.org/markup-compatibility/2006">
-        <mc:Choice xmlns:a14="http://schemas.microsoft.com/office/drawing/2010/main" Requires="a14">
-          <p:sp>
-            <p:nvSpPr>
-              <p:cNvPr id="34" name="TextBox 33">
-                <a:extLst>
-                  <a:ext uri="{FF2B5EF4-FFF2-40B4-BE49-F238E27FC236}">
-                    <a16:creationId xmlns:a16="http://schemas.microsoft.com/office/drawing/2014/main" id="{C9B1F538-A03C-4B12-8580-A004207F70A5}"/>
-                  </a:ext>
-                </a:extLst>
-              </p:cNvPr>
-              <p:cNvSpPr txBox="1"/>
-              <p:nvPr/>
-            </p:nvSpPr>
-            <p:spPr>
-              <a:xfrm>
-                <a:off x="9374099" y="1780890"/>
-                <a:ext cx="358047" cy="184666"/>
-              </a:xfrm>
-              <a:prstGeom prst="rect">
-                <a:avLst/>
-              </a:prstGeom>
-              <a:noFill/>
-            </p:spPr>
-            <p:txBody>
-              <a:bodyPr wrap="none" lIns="0" tIns="0" rIns="0" bIns="0" rtlCol="0">
-                <a:spAutoFit/>
-              </a:bodyPr>
-              <a:lstStyle/>
-              <a:p>
-                <a14:m>
-                  <m:oMathPara xmlns:m="http://schemas.openxmlformats.org/officeDocument/2006/math">
-                    <m:oMathParaPr>
-                      <m:jc m:val="centerGroup"/>
-                    </m:oMathParaPr>
-                    <m:oMath xmlns:m="http://schemas.openxmlformats.org/officeDocument/2006/math">
-                      <m:r>
-                        <a:rPr lang="en-US" sz="1200" b="0" i="1" smtClean="0">
-                          <a:latin typeface="Cambria Math" panose="02040503050406030204" pitchFamily="18" charset="0"/>
-                          <a:ea typeface="Cambria Math" panose="02040503050406030204" pitchFamily="18" charset="0"/>
-                        </a:rPr>
-                        <m:t>∆</m:t>
-                      </m:r>
-                      <m:r>
-                        <a:rPr lang="en-US" sz="1200" b="0" i="1" smtClean="0">
-                          <a:latin typeface="Cambria Math" panose="02040503050406030204" pitchFamily="18" charset="0"/>
-                        </a:rPr>
-                        <m:t>𝐿𝑎𝑡</m:t>
-                      </m:r>
-                    </m:oMath>
-                  </m:oMathPara>
-                </a14:m>
-                <a:endParaRPr lang="en-US" sz="1200" dirty="0"/>
-              </a:p>
-            </p:txBody>
-          </p:sp>
-        </mc:Choice>
-        <mc:Fallback>
-          <p:sp>
-            <p:nvSpPr>
-              <p:cNvPr id="34" name="TextBox 33">
-                <a:extLst>
-                  <a:ext uri="{FF2B5EF4-FFF2-40B4-BE49-F238E27FC236}">
-                    <a16:creationId xmlns:a16="http://schemas.microsoft.com/office/drawing/2014/main" id="{C9B1F538-A03C-4B12-8580-A004207F70A5}"/>
-                  </a:ext>
-                </a:extLst>
-              </p:cNvPr>
-              <p:cNvSpPr txBox="1">
-                <a:spLocks noRot="1" noChangeAspect="1" noMove="1" noResize="1" noEditPoints="1" noAdjustHandles="1" noChangeArrowheads="1" noChangeShapeType="1" noTextEdit="1"/>
-              </p:cNvSpPr>
-              <p:nvPr/>
-            </p:nvSpPr>
-            <p:spPr>
-              <a:xfrm>
-                <a:off x="9374099" y="1780890"/>
-                <a:ext cx="358047" cy="184666"/>
-              </a:xfrm>
-              <a:prstGeom prst="rect">
-                <a:avLst/>
-              </a:prstGeom>
-              <a:blipFill>
-                <a:blip r:embed="rId7"/>
-                <a:stretch>
-                  <a:fillRect l="-10345" r="-10345" b="-6667"/>
-                </a:stretch>
-              </a:blipFill>
-            </p:spPr>
-            <p:txBody>
-              <a:bodyPr/>
-              <a:lstStyle/>
-              <a:p>
-                <a:r>
-                  <a:rPr lang="en-US">
-                    <a:noFill/>
-                  </a:rPr>
-                  <a:t> </a:t>
-                </a:r>
-              </a:p>
-            </p:txBody>
-          </p:sp>
-        </mc:Fallback>
-      </mc:AlternateContent>
-      <mc:AlternateContent xmlns:mc="http://schemas.openxmlformats.org/markup-compatibility/2006">
-        <mc:Choice xmlns:a14="http://schemas.microsoft.com/office/drawing/2010/main" Requires="a14">
+      <mc:AlternateContent xmlns:mc="http://schemas.openxmlformats.org/markup-compatibility/2006" xmlns:a14="http://schemas.microsoft.com/office/drawing/2010/main">
+        <mc:Choice Requires="a14">
           <p:sp>
             <p:nvSpPr>
               <p:cNvPr id="12" name="TextBox 11">
@@ -8386,7 +8209,7 @@
             </p:nvSpPr>
             <p:spPr>
               <a:xfrm flipH="1">
-                <a:off x="8824126" y="800704"/>
+                <a:off x="8623601" y="1050337"/>
                 <a:ext cx="211709" cy="276999"/>
               </a:xfrm>
               <a:prstGeom prst="rect">
@@ -8400,6 +8223,7 @@
               </a:bodyPr>
               <a:lstStyle/>
               <a:p>
+                <a:pPr/>
                 <a14:m>
                   <m:oMathPara xmlns:m="http://schemas.openxmlformats.org/officeDocument/2006/math">
                     <m:oMathParaPr>
@@ -8420,7 +8244,7 @@
             </p:txBody>
           </p:sp>
         </mc:Choice>
-        <mc:Fallback>
+        <mc:Fallback xmlns="">
           <p:sp>
             <p:nvSpPr>
               <p:cNvPr id="12" name="TextBox 11">
@@ -8437,14 +8261,14 @@
             </p:nvSpPr>
             <p:spPr>
               <a:xfrm flipH="1">
-                <a:off x="8824126" y="800704"/>
+                <a:off x="8623601" y="1050337"/>
                 <a:ext cx="211709" cy="276999"/>
               </a:xfrm>
               <a:prstGeom prst="rect">
                 <a:avLst/>
               </a:prstGeom>
               <a:blipFill>
-                <a:blip r:embed="rId8"/>
+                <a:blip r:embed="rId6"/>
                 <a:stretch>
                   <a:fillRect l="-38235" r="-35294" b="-6522"/>
                 </a:stretch>
@@ -8479,14 +8303,14 @@
         </p:nvGrpSpPr>
         <p:grpSpPr>
           <a:xfrm>
-            <a:off x="564984" y="4069054"/>
-            <a:ext cx="5926435" cy="563872"/>
+            <a:off x="523419" y="3444846"/>
+            <a:ext cx="6061728" cy="563872"/>
             <a:chOff x="572656" y="3958616"/>
-            <a:chExt cx="5926435" cy="563872"/>
+            <a:chExt cx="6061728" cy="563872"/>
           </a:xfrm>
         </p:grpSpPr>
-        <mc:AlternateContent xmlns:mc="http://schemas.openxmlformats.org/markup-compatibility/2006">
-          <mc:Choice xmlns:a14="http://schemas.microsoft.com/office/drawing/2010/main" Requires="a14">
+        <mc:AlternateContent xmlns:mc="http://schemas.openxmlformats.org/markup-compatibility/2006" xmlns:a14="http://schemas.microsoft.com/office/drawing/2010/main">
+          <mc:Choice Requires="a14">
             <p:sp>
               <p:nvSpPr>
                 <p:cNvPr id="11" name="TextBox 10">
@@ -8515,6 +8339,7 @@
                 </a:bodyPr>
                 <a:lstStyle/>
                 <a:p>
+                  <a:pPr/>
                   <a14:m>
                     <m:oMathPara xmlns:m="http://schemas.openxmlformats.org/officeDocument/2006/math">
                       <m:oMathParaPr>
@@ -8625,7 +8450,7 @@
               </p:txBody>
             </p:sp>
           </mc:Choice>
-          <mc:Fallback>
+          <mc:Fallback xmlns="">
             <p:sp>
               <p:nvSpPr>
                 <p:cNvPr id="11" name="TextBox 10">
@@ -8670,8 +8495,8 @@
             </p:sp>
           </mc:Fallback>
         </mc:AlternateContent>
-        <mc:AlternateContent xmlns:mc="http://schemas.openxmlformats.org/markup-compatibility/2006">
-          <mc:Choice xmlns:a14="http://schemas.microsoft.com/office/drawing/2010/main" Requires="a14">
+        <mc:AlternateContent xmlns:mc="http://schemas.openxmlformats.org/markup-compatibility/2006" xmlns:a14="http://schemas.microsoft.com/office/drawing/2010/main">
+          <mc:Choice Requires="a14">
             <p:sp>
               <p:nvSpPr>
                 <p:cNvPr id="13" name="TextBox 12">
@@ -8700,6 +8525,7 @@
                 </a:bodyPr>
                 <a:lstStyle/>
                 <a:p>
+                  <a:pPr/>
                   <a14:m>
                     <m:oMathPara xmlns:m="http://schemas.openxmlformats.org/officeDocument/2006/math">
                       <m:oMathParaPr>
@@ -8721,7 +8547,7 @@
               </p:txBody>
             </p:sp>
           </mc:Choice>
-          <mc:Fallback>
+          <mc:Fallback xmlns="">
             <p:sp>
               <p:nvSpPr>
                 <p:cNvPr id="13" name="TextBox 12">
@@ -8766,8 +8592,8 @@
             </p:sp>
           </mc:Fallback>
         </mc:AlternateContent>
-        <mc:AlternateContent xmlns:mc="http://schemas.openxmlformats.org/markup-compatibility/2006">
-          <mc:Choice xmlns:a14="http://schemas.microsoft.com/office/drawing/2010/main" Requires="a14">
+        <mc:AlternateContent xmlns:mc="http://schemas.openxmlformats.org/markup-compatibility/2006" xmlns:a14="http://schemas.microsoft.com/office/drawing/2010/main">
+          <mc:Choice Requires="a14">
             <p:sp>
               <p:nvSpPr>
                 <p:cNvPr id="14" name="TextBox 13">
@@ -8783,7 +8609,7 @@
               <p:spPr>
                 <a:xfrm>
                   <a:off x="3862087" y="3961662"/>
-                  <a:ext cx="2637004" cy="557781"/>
+                  <a:ext cx="2772297" cy="557781"/>
                 </a:xfrm>
                 <a:prstGeom prst="rect">
                   <a:avLst/>
@@ -8796,6 +8622,7 @@
                 </a:bodyPr>
                 <a:lstStyle/>
                 <a:p>
+                  <a:pPr/>
                   <a14:m>
                     <m:oMathPara xmlns:m="http://schemas.openxmlformats.org/officeDocument/2006/math">
                       <m:oMathParaPr>
@@ -8896,7 +8723,7 @@
                                     <a:latin typeface="Cambria Math" panose="02040503050406030204" pitchFamily="18" charset="0"/>
                                     <a:ea typeface="Cambria Math" panose="02040503050406030204" pitchFamily="18" charset="0"/>
                                   </a:rPr>
-                                  <m:t>𝐷𝑒𝑐</m:t>
+                                  <m:t>𝑀𝑁𝐵</m:t>
                                 </m:r>
                               </m:e>
                             </m:d>
@@ -8910,7 +8737,7 @@
               </p:txBody>
             </p:sp>
           </mc:Choice>
-          <mc:Fallback>
+          <mc:Fallback xmlns="">
             <p:sp>
               <p:nvSpPr>
                 <p:cNvPr id="14" name="TextBox 13">
@@ -8928,7 +8755,7 @@
               <p:spPr>
                 <a:xfrm>
                   <a:off x="3862087" y="3961662"/>
-                  <a:ext cx="2637004" cy="557781"/>
+                  <a:ext cx="2772297" cy="557781"/>
                 </a:xfrm>
                 <a:prstGeom prst="rect">
                   <a:avLst/>
@@ -8936,7 +8763,7 @@
                 <a:blipFill>
                   <a:blip r:embed="rId11"/>
                   <a:stretch>
-                    <a:fillRect b="-1099"/>
+                    <a:fillRect/>
                   </a:stretch>
                 </a:blipFill>
               </p:spPr>
@@ -8956,8 +8783,8 @@
           </mc:Fallback>
         </mc:AlternateContent>
       </p:grpSp>
-      <mc:AlternateContent xmlns:mc="http://schemas.openxmlformats.org/markup-compatibility/2006">
-        <mc:Choice xmlns:a14="http://schemas.microsoft.com/office/drawing/2010/main" Requires="a14">
+      <mc:AlternateContent xmlns:mc="http://schemas.openxmlformats.org/markup-compatibility/2006" xmlns:a14="http://schemas.microsoft.com/office/drawing/2010/main">
+        <mc:Choice Requires="a14">
           <p:sp>
             <p:nvSpPr>
               <p:cNvPr id="35" name="TextBox 34">
@@ -8972,8 +8799,8 @@
             </p:nvSpPr>
             <p:spPr>
               <a:xfrm>
-                <a:off x="564984" y="4768946"/>
-                <a:ext cx="4676217" cy="557781"/>
+                <a:off x="564983" y="4126327"/>
+                <a:ext cx="4971810" cy="557781"/>
               </a:xfrm>
               <a:prstGeom prst="rect">
                 <a:avLst/>
@@ -8986,6 +8813,7 @@
               </a:bodyPr>
               <a:lstStyle/>
               <a:p>
+                <a:pPr/>
                 <a14:m>
                   <m:oMathPara xmlns:m="http://schemas.openxmlformats.org/officeDocument/2006/math">
                     <m:oMathParaPr>
@@ -9095,7 +8923,7 @@
                                       <a:latin typeface="Cambria Math" panose="02040503050406030204" pitchFamily="18" charset="0"/>
                                       <a:ea typeface="Cambria Math" panose="02040503050406030204" pitchFamily="18" charset="0"/>
                                     </a:rPr>
-                                    <m:t>𝐷𝑒𝑐</m:t>
+                                    <m:t>𝑀𝑁𝐵</m:t>
                                   </m:r>
                                 </m:e>
                               </m:d>
@@ -9151,10 +8979,11 @@
                             <m:t>∆</m:t>
                           </m:r>
                           <m:r>
-                            <a:rPr lang="en-US" i="1" dirty="0" err="1">
+                            <a:rPr lang="en-US" b="0" i="1" dirty="0" smtClean="0">
                               <a:latin typeface="Cambria Math" panose="02040503050406030204" pitchFamily="18" charset="0"/>
+                              <a:ea typeface="Cambria Math" panose="02040503050406030204" pitchFamily="18" charset="0"/>
                             </a:rPr>
-                            <m:t>𝐿𝑎𝑡</m:t>
+                            <m:t>𝑀𝐶𝑁</m:t>
                           </m:r>
                         </m:e>
                       </m:d>
@@ -9166,7 +8995,7 @@
             </p:txBody>
           </p:sp>
         </mc:Choice>
-        <mc:Fallback>
+        <mc:Fallback xmlns="">
           <p:sp>
             <p:nvSpPr>
               <p:cNvPr id="35" name="TextBox 34">
@@ -9183,8 +9012,8 @@
             </p:nvSpPr>
             <p:spPr>
               <a:xfrm>
-                <a:off x="564984" y="4768946"/>
-                <a:ext cx="4676217" cy="557781"/>
+                <a:off x="564983" y="4126327"/>
+                <a:ext cx="4971810" cy="557781"/>
               </a:xfrm>
               <a:prstGeom prst="rect">
                 <a:avLst/>
@@ -9192,7 +9021,7 @@
               <a:blipFill>
                 <a:blip r:embed="rId12"/>
                 <a:stretch>
-                  <a:fillRect/>
+                  <a:fillRect b="-1099"/>
                 </a:stretch>
               </a:blipFill>
             </p:spPr>
@@ -9211,54 +9040,8 @@
           </p:sp>
         </mc:Fallback>
       </mc:AlternateContent>
-      <p:sp>
-        <p:nvSpPr>
-          <p:cNvPr id="36" name="Oval 35">
-            <a:extLst>
-              <a:ext uri="{FF2B5EF4-FFF2-40B4-BE49-F238E27FC236}">
-                <a16:creationId xmlns:a16="http://schemas.microsoft.com/office/drawing/2014/main" id="{36EE4556-6C91-45F2-BBDC-2AE49534AA33}"/>
-              </a:ext>
-            </a:extLst>
-          </p:cNvPr>
-          <p:cNvSpPr/>
-          <p:nvPr/>
-        </p:nvSpPr>
-        <p:spPr>
-          <a:xfrm>
-            <a:off x="8534714" y="2019107"/>
-            <a:ext cx="106330" cy="118830"/>
-          </a:xfrm>
-          <a:prstGeom prst="ellipse">
-            <a:avLst/>
-          </a:prstGeom>
-        </p:spPr>
-        <p:style>
-          <a:lnRef idx="2">
-            <a:schemeClr val="dk1">
-              <a:shade val="50000"/>
-            </a:schemeClr>
-          </a:lnRef>
-          <a:fillRef idx="1">
-            <a:schemeClr val="dk1"/>
-          </a:fillRef>
-          <a:effectRef idx="0">
-            <a:schemeClr val="dk1"/>
-          </a:effectRef>
-          <a:fontRef idx="minor">
-            <a:schemeClr val="lt1"/>
-          </a:fontRef>
-        </p:style>
-        <p:txBody>
-          <a:bodyPr rtlCol="0" anchor="ctr"/>
-          <a:lstStyle/>
-          <a:p>
-            <a:pPr algn="ctr"/>
-            <a:endParaRPr lang="en-US"/>
-          </a:p>
-        </p:txBody>
-      </p:sp>
-      <mc:AlternateContent xmlns:mc="http://schemas.openxmlformats.org/markup-compatibility/2006">
-        <mc:Choice xmlns:a14="http://schemas.microsoft.com/office/drawing/2010/main" Requires="a14">
+      <mc:AlternateContent xmlns:mc="http://schemas.openxmlformats.org/markup-compatibility/2006" xmlns:a14="http://schemas.microsoft.com/office/drawing/2010/main">
+        <mc:Choice Requires="a14">
           <p:sp>
             <p:nvSpPr>
               <p:cNvPr id="38" name="TextBox 37">
@@ -9273,7 +9056,7 @@
             </p:nvSpPr>
             <p:spPr>
               <a:xfrm flipH="1">
-                <a:off x="9338333" y="382496"/>
+                <a:off x="9487204" y="683984"/>
                 <a:ext cx="211709" cy="276999"/>
               </a:xfrm>
               <a:prstGeom prst="rect">
@@ -9287,6 +9070,7 @@
               </a:bodyPr>
               <a:lstStyle/>
               <a:p>
+                <a:pPr/>
                 <a14:m>
                   <m:oMathPara xmlns:m="http://schemas.openxmlformats.org/officeDocument/2006/math">
                     <m:oMathParaPr>
@@ -9307,7 +9091,7 @@
             </p:txBody>
           </p:sp>
         </mc:Choice>
-        <mc:Fallback>
+        <mc:Fallback xmlns="">
           <p:sp>
             <p:nvSpPr>
               <p:cNvPr id="38" name="TextBox 37">
@@ -9324,7 +9108,7 @@
             </p:nvSpPr>
             <p:spPr>
               <a:xfrm flipH="1">
-                <a:off x="9338333" y="382496"/>
+                <a:off x="9487204" y="683984"/>
                 <a:ext cx="211709" cy="276999"/>
               </a:xfrm>
               <a:prstGeom prst="rect">
@@ -9333,7 +9117,7 @@
               <a:blipFill>
                 <a:blip r:embed="rId13"/>
                 <a:stretch>
-                  <a:fillRect l="-20000" r="-14286" b="-6667"/>
+                  <a:fillRect l="-17143" r="-17143" b="-6522"/>
                 </a:stretch>
               </a:blipFill>
             </p:spPr>
@@ -9352,41 +9136,6 @@
           </p:sp>
         </mc:Fallback>
       </mc:AlternateContent>
-      <p:sp>
-        <p:nvSpPr>
-          <p:cNvPr id="39" name="TextBox 38">
-            <a:extLst>
-              <a:ext uri="{FF2B5EF4-FFF2-40B4-BE49-F238E27FC236}">
-                <a16:creationId xmlns:a16="http://schemas.microsoft.com/office/drawing/2014/main" id="{E658184F-B1B6-4836-8149-B9060C476044}"/>
-              </a:ext>
-            </a:extLst>
-          </p:cNvPr>
-          <p:cNvSpPr txBox="1"/>
-          <p:nvPr/>
-        </p:nvSpPr>
-        <p:spPr>
-          <a:xfrm flipH="1">
-            <a:off x="8898005" y="207633"/>
-            <a:ext cx="591902" cy="369332"/>
-          </a:xfrm>
-          <a:prstGeom prst="rect">
-            <a:avLst/>
-          </a:prstGeom>
-          <a:noFill/>
-        </p:spPr>
-        <p:txBody>
-          <a:bodyPr wrap="square" rtlCol="0">
-            <a:spAutoFit/>
-          </a:bodyPr>
-          <a:lstStyle/>
-          <a:p>
-            <a:r>
-              <a:rPr lang="en-US" dirty="0"/>
-              <a:t>Site</a:t>
-            </a:r>
-          </a:p>
-        </p:txBody>
-      </p:sp>
       <p:cxnSp>
         <p:nvCxnSpPr>
           <p:cNvPr id="26" name="Straight Connector 25">
@@ -9398,14 +9147,15 @@
           </p:cNvPr>
           <p:cNvCxnSpPr>
             <a:cxnSpLocks/>
-            <a:stCxn id="3" idx="1"/>
+            <a:stCxn id="3" idx="5"/>
+            <a:endCxn id="57" idx="0"/>
           </p:cNvCxnSpPr>
           <p:nvPr/>
         </p:nvCxnSpPr>
         <p:spPr>
           <a:xfrm>
-            <a:off x="9430124" y="682948"/>
-            <a:ext cx="748629" cy="1379576"/>
+            <a:off x="9391542" y="881899"/>
+            <a:ext cx="773925" cy="1090918"/>
           </a:xfrm>
           <a:prstGeom prst="line">
             <a:avLst/>
@@ -9438,18 +9188,20 @@
           </p:cNvPr>
           <p:cNvCxnSpPr>
             <a:cxnSpLocks/>
+            <a:stCxn id="41" idx="7"/>
             <a:endCxn id="3" idx="2"/>
           </p:cNvCxnSpPr>
           <p:nvPr/>
         </p:nvCxnSpPr>
         <p:spPr>
           <a:xfrm flipV="1">
-            <a:off x="3347219" y="724961"/>
-            <a:ext cx="6067333" cy="1385804"/>
+            <a:off x="4903907" y="839886"/>
+            <a:ext cx="4396877" cy="422182"/>
           </a:xfrm>
           <a:prstGeom prst="line">
             <a:avLst/>
           </a:prstGeom>
+          <a:ln w="28575"/>
         </p:spPr>
         <p:style>
           <a:lnRef idx="1">
@@ -9466,8 +9218,8 @@
           </a:fontRef>
         </p:style>
       </p:cxnSp>
-      <mc:AlternateContent xmlns:mc="http://schemas.openxmlformats.org/markup-compatibility/2006">
-        <mc:Choice xmlns:a14="http://schemas.microsoft.com/office/drawing/2010/main" Requires="a14">
+      <mc:AlternateContent xmlns:mc="http://schemas.openxmlformats.org/markup-compatibility/2006" xmlns:a14="http://schemas.microsoft.com/office/drawing/2010/main">
+        <mc:Choice Requires="a14">
           <p:sp>
             <p:nvSpPr>
               <p:cNvPr id="45" name="TextBox 44">
@@ -9482,8 +9234,8 @@
             </p:nvSpPr>
             <p:spPr>
               <a:xfrm>
-                <a:off x="564984" y="5462747"/>
-                <a:ext cx="6869573" cy="414537"/>
+                <a:off x="523419" y="5419894"/>
+                <a:ext cx="7098803" cy="414537"/>
               </a:xfrm>
               <a:prstGeom prst="rect">
                 <a:avLst/>
@@ -9496,45 +9248,27 @@
               </a:bodyPr>
               <a:lstStyle/>
               <a:p>
+                <a:pPr/>
                 <a14:m>
                   <m:oMathPara xmlns:m="http://schemas.openxmlformats.org/officeDocument/2006/math">
                     <m:oMathParaPr>
                       <m:jc m:val="centerGroup"/>
                     </m:oMathParaPr>
                     <m:oMath xmlns:m="http://schemas.openxmlformats.org/officeDocument/2006/math">
-                      <m:sSub>
-                        <m:sSubPr>
-                          <m:ctrlPr>
-                            <a:rPr lang="en-US" i="1" smtClean="0">
-                              <a:latin typeface="Cambria Math" panose="02040503050406030204" pitchFamily="18" charset="0"/>
-                            </a:rPr>
-                          </m:ctrlPr>
-                        </m:sSubPr>
-                        <m:e>
-                          <m:r>
-                            <a:rPr lang="en-US" i="1" smtClean="0">
-                              <a:latin typeface="Cambria Math" panose="02040503050406030204" pitchFamily="18" charset="0"/>
-                              <a:ea typeface="Cambria Math" panose="02040503050406030204" pitchFamily="18" charset="0"/>
-                            </a:rPr>
-                            <m:t>∆</m:t>
-                          </m:r>
-                          <m:r>
-                            <a:rPr lang="en-US" b="0" i="1" smtClean="0">
-                              <a:latin typeface="Cambria Math" panose="02040503050406030204" pitchFamily="18" charset="0"/>
-                              <a:ea typeface="Cambria Math" panose="02040503050406030204" pitchFamily="18" charset="0"/>
-                            </a:rPr>
-                            <m:t>𝐷𝑒𝑐</m:t>
-                          </m:r>
-                        </m:e>
-                        <m:sub>
-                          <m:r>
-                            <a:rPr lang="en-US" b="0" i="1" smtClean="0">
-                              <a:latin typeface="Cambria Math" panose="02040503050406030204" pitchFamily="18" charset="0"/>
-                            </a:rPr>
-                            <m:t>𝑆</m:t>
-                          </m:r>
-                        </m:sub>
-                      </m:sSub>
+                      <m:r>
+                        <a:rPr lang="en-US" b="0" i="1" smtClean="0">
+                          <a:latin typeface="Cambria Math" panose="02040503050406030204" pitchFamily="18" charset="0"/>
+                          <a:ea typeface="Cambria Math" panose="02040503050406030204" pitchFamily="18" charset="0"/>
+                        </a:rPr>
+                        <m:t>∆</m:t>
+                      </m:r>
+                      <m:r>
+                        <a:rPr lang="en-US" b="0" i="1" smtClean="0">
+                          <a:latin typeface="Cambria Math" panose="02040503050406030204" pitchFamily="18" charset="0"/>
+                          <a:ea typeface="Cambria Math" panose="02040503050406030204" pitchFamily="18" charset="0"/>
+                        </a:rPr>
+                        <m:t>𝑆𝑁𝐶</m:t>
+                      </m:r>
                       <m:r>
                         <a:rPr lang="en-US" b="0" i="1" smtClean="0">
                           <a:latin typeface="Cambria Math" panose="02040503050406030204" pitchFamily="18" charset="0"/>
@@ -9662,34 +9396,19 @@
                                           </m:ctrlPr>
                                         </m:dPr>
                                         <m:e>
-                                          <m:sSub>
-                                            <m:sSubPr>
-                                              <m:ctrlPr>
-                                                <a:rPr lang="en-US" i="1">
-                                                  <a:latin typeface="Cambria Math" panose="02040503050406030204" pitchFamily="18" charset="0"/>
-                                                  <a:ea typeface="Cambria Math" panose="02040503050406030204" pitchFamily="18" charset="0"/>
-                                                </a:rPr>
-                                              </m:ctrlPr>
-                                            </m:sSubPr>
-                                            <m:e>
-                                              <m:r>
-                                                <a:rPr lang="en-US" i="1">
-                                                  <a:latin typeface="Cambria Math" panose="02040503050406030204" pitchFamily="18" charset="0"/>
-                                                  <a:ea typeface="Cambria Math" panose="02040503050406030204" pitchFamily="18" charset="0"/>
-                                                </a:rPr>
-                                                <m:t>𝐿𝑎𝑡</m:t>
-                                              </m:r>
-                                            </m:e>
-                                            <m:sub>
-                                              <m:r>
-                                                <a:rPr lang="en-US" i="1">
-                                                  <a:latin typeface="Cambria Math" panose="02040503050406030204" pitchFamily="18" charset="0"/>
-                                                  <a:ea typeface="Cambria Math" panose="02040503050406030204" pitchFamily="18" charset="0"/>
-                                                </a:rPr>
-                                                <m:t>𝑠</m:t>
-                                              </m:r>
-                                            </m:sub>
-                                          </m:sSub>
+                                          <m:r>
+                                            <a:rPr lang="en-US" i="1">
+                                              <a:latin typeface="Cambria Math" panose="02040503050406030204" pitchFamily="18" charset="0"/>
+                                              <a:ea typeface="Cambria Math" panose="02040503050406030204" pitchFamily="18" charset="0"/>
+                                            </a:rPr>
+                                            <m:t>∆</m:t>
+                                          </m:r>
+                                          <m:r>
+                                            <a:rPr lang="en-US" i="1">
+                                              <a:latin typeface="Cambria Math" panose="02040503050406030204" pitchFamily="18" charset="0"/>
+                                            </a:rPr>
+                                            <m:t>𝑆𝐶𝑁</m:t>
+                                          </m:r>
                                         </m:e>
                                       </m:d>
                                     </m:e>
@@ -9815,34 +9534,19 @@
                                               </m:ctrlPr>
                                             </m:dPr>
                                             <m:e>
-                                              <m:sSub>
-                                                <m:sSubPr>
-                                                  <m:ctrlPr>
-                                                    <a:rPr lang="en-US" b="0" i="1" smtClean="0">
-                                                      <a:latin typeface="Cambria Math" panose="02040503050406030204" pitchFamily="18" charset="0"/>
-                                                      <a:ea typeface="Cambria Math" panose="02040503050406030204" pitchFamily="18" charset="0"/>
-                                                    </a:rPr>
-                                                  </m:ctrlPr>
-                                                </m:sSubPr>
-                                                <m:e>
-                                                  <m:r>
-                                                    <a:rPr lang="en-US" b="0" i="1" smtClean="0">
-                                                      <a:latin typeface="Cambria Math" panose="02040503050406030204" pitchFamily="18" charset="0"/>
-                                                      <a:ea typeface="Cambria Math" panose="02040503050406030204" pitchFamily="18" charset="0"/>
-                                                    </a:rPr>
-                                                    <m:t>𝐿𝑎𝑡</m:t>
-                                                  </m:r>
-                                                </m:e>
-                                                <m:sub>
-                                                  <m:r>
-                                                    <a:rPr lang="en-US" b="0" i="1" smtClean="0">
-                                                      <a:latin typeface="Cambria Math" panose="02040503050406030204" pitchFamily="18" charset="0"/>
-                                                      <a:ea typeface="Cambria Math" panose="02040503050406030204" pitchFamily="18" charset="0"/>
-                                                    </a:rPr>
-                                                    <m:t>𝑆</m:t>
-                                                  </m:r>
-                                                </m:sub>
-                                              </m:sSub>
+                                              <m:r>
+                                                <a:rPr lang="en-US" i="1">
+                                                  <a:latin typeface="Cambria Math" panose="02040503050406030204" pitchFamily="18" charset="0"/>
+                                                  <a:ea typeface="Cambria Math" panose="02040503050406030204" pitchFamily="18" charset="0"/>
+                                                </a:rPr>
+                                                <m:t>∆</m:t>
+                                              </m:r>
+                                              <m:r>
+                                                <a:rPr lang="en-US" i="1">
+                                                  <a:latin typeface="Cambria Math" panose="02040503050406030204" pitchFamily="18" charset="0"/>
+                                                </a:rPr>
+                                                <m:t>𝑆𝐶𝑁</m:t>
+                                              </m:r>
                                             </m:e>
                                           </m:d>
                                         </m:e>
@@ -9869,7 +9573,7 @@
             </p:txBody>
           </p:sp>
         </mc:Choice>
-        <mc:Fallback>
+        <mc:Fallback xmlns="">
           <p:sp>
             <p:nvSpPr>
               <p:cNvPr id="45" name="TextBox 44">
@@ -9886,8 +9590,8 @@
             </p:nvSpPr>
             <p:spPr>
               <a:xfrm>
-                <a:off x="564984" y="5462747"/>
-                <a:ext cx="6869573" cy="414537"/>
+                <a:off x="523419" y="5419894"/>
+                <a:ext cx="7098803" cy="414537"/>
               </a:xfrm>
               <a:prstGeom prst="rect">
                 <a:avLst/>
@@ -9895,7 +9599,710 @@
               <a:blipFill>
                 <a:blip r:embed="rId14"/>
                 <a:stretch>
-                  <a:fillRect b="-7353"/>
+                  <a:fillRect l="-344" b="-7353"/>
+                </a:stretch>
+              </a:blipFill>
+            </p:spPr>
+            <p:txBody>
+              <a:bodyPr/>
+              <a:lstStyle/>
+              <a:p>
+                <a:r>
+                  <a:rPr lang="en-US">
+                    <a:noFill/>
+                  </a:rPr>
+                  <a:t> </a:t>
+                </a:r>
+              </a:p>
+            </p:txBody>
+          </p:sp>
+        </mc:Fallback>
+      </mc:AlternateContent>
+      <mc:AlternateContent xmlns:mc="http://schemas.openxmlformats.org/markup-compatibility/2006" xmlns:a14="http://schemas.microsoft.com/office/drawing/2010/main">
+        <mc:Choice Requires="a14">
+          <p:sp>
+            <p:nvSpPr>
+              <p:cNvPr id="40" name="TextBox 39">
+                <a:extLst>
+                  <a:ext uri="{FF2B5EF4-FFF2-40B4-BE49-F238E27FC236}">
+                    <a16:creationId xmlns:a16="http://schemas.microsoft.com/office/drawing/2014/main" id="{D802676C-E991-4864-B570-4AF6499D3B4D}"/>
+                  </a:ext>
+                </a:extLst>
+              </p:cNvPr>
+              <p:cNvSpPr txBox="1"/>
+              <p:nvPr/>
+            </p:nvSpPr>
+            <p:spPr>
+              <a:xfrm>
+                <a:off x="587481" y="4940615"/>
+                <a:ext cx="2193486" cy="276999"/>
+              </a:xfrm>
+              <a:prstGeom prst="rect">
+                <a:avLst/>
+              </a:prstGeom>
+              <a:noFill/>
+            </p:spPr>
+            <p:txBody>
+              <a:bodyPr wrap="none" lIns="0" tIns="0" rIns="0" bIns="0" rtlCol="0">
+                <a:spAutoFit/>
+              </a:bodyPr>
+              <a:lstStyle/>
+              <a:p>
+                <a:pPr/>
+                <a14:m>
+                  <m:oMathPara xmlns:m="http://schemas.openxmlformats.org/officeDocument/2006/math">
+                    <m:oMathParaPr>
+                      <m:jc m:val="centerGroup"/>
+                    </m:oMathParaPr>
+                    <m:oMath xmlns:m="http://schemas.openxmlformats.org/officeDocument/2006/math">
+                      <m:r>
+                        <a:rPr lang="en-US" b="0" i="1" smtClean="0">
+                          <a:latin typeface="Cambria Math" panose="02040503050406030204" pitchFamily="18" charset="0"/>
+                          <a:ea typeface="Cambria Math" panose="02040503050406030204" pitchFamily="18" charset="0"/>
+                        </a:rPr>
+                        <m:t>∆</m:t>
+                      </m:r>
+                      <m:r>
+                        <a:rPr lang="en-US" b="0" i="1" smtClean="0">
+                          <a:latin typeface="Cambria Math" panose="02040503050406030204" pitchFamily="18" charset="0"/>
+                        </a:rPr>
+                        <m:t>𝑆𝐶𝑁</m:t>
+                      </m:r>
+                      <m:r>
+                        <a:rPr lang="en-US" b="0" i="1" smtClean="0">
+                          <a:latin typeface="Cambria Math" panose="02040503050406030204" pitchFamily="18" charset="0"/>
+                        </a:rPr>
+                        <m:t>=</m:t>
+                      </m:r>
+                      <m:sSub>
+                        <m:sSubPr>
+                          <m:ctrlPr>
+                            <a:rPr lang="en-US" b="0" i="1" smtClean="0">
+                              <a:latin typeface="Cambria Math" panose="02040503050406030204" pitchFamily="18" charset="0"/>
+                            </a:rPr>
+                          </m:ctrlPr>
+                        </m:sSubPr>
+                        <m:e>
+                          <m:r>
+                            <a:rPr lang="en-US" b="0" i="1" smtClean="0">
+                              <a:latin typeface="Cambria Math" panose="02040503050406030204" pitchFamily="18" charset="0"/>
+                            </a:rPr>
+                            <m:t>𝐿𝑎𝑡</m:t>
+                          </m:r>
+                        </m:e>
+                        <m:sub>
+                          <m:r>
+                            <a:rPr lang="en-US" b="0" i="1" smtClean="0">
+                              <a:latin typeface="Cambria Math" panose="02040503050406030204" pitchFamily="18" charset="0"/>
+                            </a:rPr>
+                            <m:t>𝑆</m:t>
+                          </m:r>
+                        </m:sub>
+                      </m:sSub>
+                      <m:r>
+                        <a:rPr lang="en-US" b="0" i="1" smtClean="0">
+                          <a:latin typeface="Cambria Math" panose="02040503050406030204" pitchFamily="18" charset="0"/>
+                        </a:rPr>
+                        <m:t> −</m:t>
+                      </m:r>
+                      <m:sSub>
+                        <m:sSubPr>
+                          <m:ctrlPr>
+                            <a:rPr lang="en-US" b="0" i="1" smtClean="0">
+                              <a:latin typeface="Cambria Math" panose="02040503050406030204" pitchFamily="18" charset="0"/>
+                            </a:rPr>
+                          </m:ctrlPr>
+                        </m:sSubPr>
+                        <m:e>
+                          <m:r>
+                            <a:rPr lang="en-US" b="0" i="1" smtClean="0">
+                              <a:latin typeface="Cambria Math" panose="02040503050406030204" pitchFamily="18" charset="0"/>
+                            </a:rPr>
+                            <m:t>𝐷𝑒𝑐</m:t>
+                          </m:r>
+                        </m:e>
+                        <m:sub>
+                          <m:r>
+                            <a:rPr lang="en-US" b="0" i="1" smtClean="0">
+                              <a:latin typeface="Cambria Math" panose="02040503050406030204" pitchFamily="18" charset="0"/>
+                            </a:rPr>
+                            <m:t>𝐺</m:t>
+                          </m:r>
+                        </m:sub>
+                      </m:sSub>
+                    </m:oMath>
+                  </m:oMathPara>
+                </a14:m>
+                <a:endParaRPr lang="en-US" dirty="0"/>
+              </a:p>
+            </p:txBody>
+          </p:sp>
+        </mc:Choice>
+        <mc:Fallback xmlns="">
+          <p:sp>
+            <p:nvSpPr>
+              <p:cNvPr id="40" name="TextBox 39">
+                <a:extLst>
+                  <a:ext uri="{FF2B5EF4-FFF2-40B4-BE49-F238E27FC236}">
+                    <a16:creationId xmlns:a16="http://schemas.microsoft.com/office/drawing/2014/main" id="{D802676C-E991-4864-B570-4AF6499D3B4D}"/>
+                  </a:ext>
+                </a:extLst>
+              </p:cNvPr>
+              <p:cNvSpPr txBox="1">
+                <a:spLocks noRot="1" noChangeAspect="1" noMove="1" noResize="1" noEditPoints="1" noAdjustHandles="1" noChangeArrowheads="1" noChangeShapeType="1" noTextEdit="1"/>
+              </p:cNvSpPr>
+              <p:nvPr/>
+            </p:nvSpPr>
+            <p:spPr>
+              <a:xfrm>
+                <a:off x="587481" y="4940615"/>
+                <a:ext cx="2193486" cy="276999"/>
+              </a:xfrm>
+              <a:prstGeom prst="rect">
+                <a:avLst/>
+              </a:prstGeom>
+              <a:blipFill>
+                <a:blip r:embed="rId15"/>
+                <a:stretch>
+                  <a:fillRect l="-1944" r="-278" b="-15217"/>
+                </a:stretch>
+              </a:blipFill>
+            </p:spPr>
+            <p:txBody>
+              <a:bodyPr/>
+              <a:lstStyle/>
+              <a:p>
+                <a:r>
+                  <a:rPr lang="en-US">
+                    <a:noFill/>
+                  </a:rPr>
+                  <a:t> </a:t>
+                </a:r>
+              </a:p>
+            </p:txBody>
+          </p:sp>
+        </mc:Fallback>
+      </mc:AlternateContent>
+      <p:sp>
+        <p:nvSpPr>
+          <p:cNvPr id="41" name="Oval 40">
+            <a:extLst>
+              <a:ext uri="{FF2B5EF4-FFF2-40B4-BE49-F238E27FC236}">
+                <a16:creationId xmlns:a16="http://schemas.microsoft.com/office/drawing/2014/main" id="{717E84D2-553B-40FD-B02B-1F5D3342D0B4}"/>
+              </a:ext>
+            </a:extLst>
+          </p:cNvPr>
+          <p:cNvSpPr/>
+          <p:nvPr/>
+        </p:nvSpPr>
+        <p:spPr>
+          <a:xfrm>
+            <a:off x="4813149" y="1244666"/>
+            <a:ext cx="106330" cy="118830"/>
+          </a:xfrm>
+          <a:prstGeom prst="ellipse">
+            <a:avLst/>
+          </a:prstGeom>
+        </p:spPr>
+        <p:style>
+          <a:lnRef idx="2">
+            <a:schemeClr val="dk1">
+              <a:shade val="50000"/>
+            </a:schemeClr>
+          </a:lnRef>
+          <a:fillRef idx="1">
+            <a:schemeClr val="dk1"/>
+          </a:fillRef>
+          <a:effectRef idx="0">
+            <a:schemeClr val="dk1"/>
+          </a:effectRef>
+          <a:fontRef idx="minor">
+            <a:schemeClr val="lt1"/>
+          </a:fontRef>
+        </p:style>
+        <p:txBody>
+          <a:bodyPr rtlCol="0" anchor="ctr"/>
+          <a:lstStyle/>
+          <a:p>
+            <a:pPr algn="ctr"/>
+            <a:endParaRPr lang="en-US"/>
+          </a:p>
+        </p:txBody>
+      </p:sp>
+      <p:sp>
+        <p:nvSpPr>
+          <p:cNvPr id="42" name="Oval 41">
+            <a:extLst>
+              <a:ext uri="{FF2B5EF4-FFF2-40B4-BE49-F238E27FC236}">
+                <a16:creationId xmlns:a16="http://schemas.microsoft.com/office/drawing/2014/main" id="{32BBF9C8-C50E-477A-8D22-67BCF19B880A}"/>
+              </a:ext>
+            </a:extLst>
+          </p:cNvPr>
+          <p:cNvSpPr/>
+          <p:nvPr/>
+        </p:nvSpPr>
+        <p:spPr>
+          <a:xfrm>
+            <a:off x="8740205" y="1312043"/>
+            <a:ext cx="106330" cy="118830"/>
+          </a:xfrm>
+          <a:prstGeom prst="ellipse">
+            <a:avLst/>
+          </a:prstGeom>
+        </p:spPr>
+        <p:style>
+          <a:lnRef idx="2">
+            <a:schemeClr val="dk1">
+              <a:shade val="50000"/>
+            </a:schemeClr>
+          </a:lnRef>
+          <a:fillRef idx="1">
+            <a:schemeClr val="dk1"/>
+          </a:fillRef>
+          <a:effectRef idx="0">
+            <a:schemeClr val="dk1"/>
+          </a:effectRef>
+          <a:fontRef idx="minor">
+            <a:schemeClr val="lt1"/>
+          </a:fontRef>
+        </p:style>
+        <p:txBody>
+          <a:bodyPr rtlCol="0" anchor="ctr"/>
+          <a:lstStyle/>
+          <a:p>
+            <a:pPr algn="ctr"/>
+            <a:endParaRPr lang="en-US"/>
+          </a:p>
+        </p:txBody>
+      </p:sp>
+      <p:sp>
+        <p:nvSpPr>
+          <p:cNvPr id="57" name="Oval 56">
+            <a:extLst>
+              <a:ext uri="{FF2B5EF4-FFF2-40B4-BE49-F238E27FC236}">
+                <a16:creationId xmlns:a16="http://schemas.microsoft.com/office/drawing/2014/main" id="{3C2DD6FE-1026-4186-AE97-5B059498700D}"/>
+              </a:ext>
+            </a:extLst>
+          </p:cNvPr>
+          <p:cNvSpPr/>
+          <p:nvPr/>
+        </p:nvSpPr>
+        <p:spPr>
+          <a:xfrm>
+            <a:off x="10112302" y="1972817"/>
+            <a:ext cx="106330" cy="118830"/>
+          </a:xfrm>
+          <a:prstGeom prst="ellipse">
+            <a:avLst/>
+          </a:prstGeom>
+        </p:spPr>
+        <p:style>
+          <a:lnRef idx="2">
+            <a:schemeClr val="dk1">
+              <a:shade val="50000"/>
+            </a:schemeClr>
+          </a:lnRef>
+          <a:fillRef idx="1">
+            <a:schemeClr val="dk1"/>
+          </a:fillRef>
+          <a:effectRef idx="0">
+            <a:schemeClr val="dk1"/>
+          </a:effectRef>
+          <a:fontRef idx="minor">
+            <a:schemeClr val="lt1"/>
+          </a:fontRef>
+        </p:style>
+        <p:txBody>
+          <a:bodyPr rtlCol="0" anchor="ctr"/>
+          <a:lstStyle/>
+          <a:p>
+            <a:pPr algn="ctr"/>
+            <a:endParaRPr lang="en-US"/>
+          </a:p>
+        </p:txBody>
+      </p:sp>
+      <p:sp>
+        <p:nvSpPr>
+          <p:cNvPr id="72" name="Oval 71">
+            <a:extLst>
+              <a:ext uri="{FF2B5EF4-FFF2-40B4-BE49-F238E27FC236}">
+                <a16:creationId xmlns:a16="http://schemas.microsoft.com/office/drawing/2014/main" id="{C1867D76-ACBF-48D3-9A92-49B1CBBEAF85}"/>
+              </a:ext>
+            </a:extLst>
+          </p:cNvPr>
+          <p:cNvSpPr/>
+          <p:nvPr/>
+        </p:nvSpPr>
+        <p:spPr>
+          <a:xfrm>
+            <a:off x="8696062" y="1784590"/>
+            <a:ext cx="106330" cy="118830"/>
+          </a:xfrm>
+          <a:prstGeom prst="ellipse">
+            <a:avLst/>
+          </a:prstGeom>
+        </p:spPr>
+        <p:style>
+          <a:lnRef idx="2">
+            <a:schemeClr val="dk1">
+              <a:shade val="50000"/>
+            </a:schemeClr>
+          </a:lnRef>
+          <a:fillRef idx="1">
+            <a:schemeClr val="dk1"/>
+          </a:fillRef>
+          <a:effectRef idx="0">
+            <a:schemeClr val="dk1"/>
+          </a:effectRef>
+          <a:fontRef idx="minor">
+            <a:schemeClr val="lt1"/>
+          </a:fontRef>
+        </p:style>
+        <p:txBody>
+          <a:bodyPr rtlCol="0" anchor="ctr"/>
+          <a:lstStyle/>
+          <a:p>
+            <a:pPr algn="ctr"/>
+            <a:endParaRPr lang="en-US"/>
+          </a:p>
+        </p:txBody>
+      </p:sp>
+      <p:sp>
+        <p:nvSpPr>
+          <p:cNvPr id="74" name="Oval 73">
+            <a:extLst>
+              <a:ext uri="{FF2B5EF4-FFF2-40B4-BE49-F238E27FC236}">
+                <a16:creationId xmlns:a16="http://schemas.microsoft.com/office/drawing/2014/main" id="{FC6E7EC6-90CD-4476-878F-90F17503620D}"/>
+              </a:ext>
+            </a:extLst>
+          </p:cNvPr>
+          <p:cNvSpPr/>
+          <p:nvPr/>
+        </p:nvSpPr>
+        <p:spPr>
+          <a:xfrm>
+            <a:off x="9213251" y="1859820"/>
+            <a:ext cx="106330" cy="118830"/>
+          </a:xfrm>
+          <a:prstGeom prst="ellipse">
+            <a:avLst/>
+          </a:prstGeom>
+        </p:spPr>
+        <p:style>
+          <a:lnRef idx="2">
+            <a:schemeClr val="dk1">
+              <a:shade val="50000"/>
+            </a:schemeClr>
+          </a:lnRef>
+          <a:fillRef idx="1">
+            <a:schemeClr val="dk1"/>
+          </a:fillRef>
+          <a:effectRef idx="0">
+            <a:schemeClr val="dk1"/>
+          </a:effectRef>
+          <a:fontRef idx="minor">
+            <a:schemeClr val="lt1"/>
+          </a:fontRef>
+        </p:style>
+        <p:txBody>
+          <a:bodyPr rtlCol="0" anchor="ctr"/>
+          <a:lstStyle/>
+          <a:p>
+            <a:pPr algn="ctr"/>
+            <a:endParaRPr lang="en-US"/>
+          </a:p>
+        </p:txBody>
+      </p:sp>
+      <p:cxnSp>
+        <p:nvCxnSpPr>
+          <p:cNvPr id="75" name="Straight Connector 74">
+            <a:extLst>
+              <a:ext uri="{FF2B5EF4-FFF2-40B4-BE49-F238E27FC236}">
+                <a16:creationId xmlns:a16="http://schemas.microsoft.com/office/drawing/2014/main" id="{7D7E8D98-47B2-4C95-B150-2BAA41117295}"/>
+              </a:ext>
+            </a:extLst>
+          </p:cNvPr>
+          <p:cNvCxnSpPr>
+            <a:cxnSpLocks/>
+            <a:stCxn id="3" idx="4"/>
+            <a:endCxn id="74" idx="0"/>
+          </p:cNvCxnSpPr>
+          <p:nvPr/>
+        </p:nvCxnSpPr>
+        <p:spPr>
+          <a:xfrm flipH="1">
+            <a:off x="9266416" y="899301"/>
+            <a:ext cx="87533" cy="960519"/>
+          </a:xfrm>
+          <a:prstGeom prst="line">
+            <a:avLst/>
+          </a:prstGeom>
+          <a:ln w="28575"/>
+        </p:spPr>
+        <p:style>
+          <a:lnRef idx="1">
+            <a:schemeClr val="accent1"/>
+          </a:lnRef>
+          <a:fillRef idx="0">
+            <a:schemeClr val="accent1"/>
+          </a:fillRef>
+          <a:effectRef idx="0">
+            <a:schemeClr val="accent1"/>
+          </a:effectRef>
+          <a:fontRef idx="minor">
+            <a:schemeClr val="tx1"/>
+          </a:fontRef>
+        </p:style>
+      </p:cxnSp>
+      <p:sp>
+        <p:nvSpPr>
+          <p:cNvPr id="91" name="Rectangle 90">
+            <a:extLst>
+              <a:ext uri="{FF2B5EF4-FFF2-40B4-BE49-F238E27FC236}">
+                <a16:creationId xmlns:a16="http://schemas.microsoft.com/office/drawing/2014/main" id="{2C539BFA-DF16-4800-A8B0-37A22E5570A0}"/>
+              </a:ext>
+            </a:extLst>
+          </p:cNvPr>
+          <p:cNvSpPr/>
+          <p:nvPr/>
+        </p:nvSpPr>
+        <p:spPr>
+          <a:xfrm rot="510549">
+            <a:off x="9278358" y="1806511"/>
+            <a:ext cx="90819" cy="111581"/>
+          </a:xfrm>
+          <a:prstGeom prst="rect">
+            <a:avLst/>
+          </a:prstGeom>
+          <a:noFill/>
+          <a:ln w="25400"/>
+        </p:spPr>
+        <p:style>
+          <a:lnRef idx="2">
+            <a:schemeClr val="accent1">
+              <a:shade val="50000"/>
+            </a:schemeClr>
+          </a:lnRef>
+          <a:fillRef idx="1">
+            <a:schemeClr val="accent1"/>
+          </a:fillRef>
+          <a:effectRef idx="0">
+            <a:schemeClr val="accent1"/>
+          </a:effectRef>
+          <a:fontRef idx="minor">
+            <a:schemeClr val="lt1"/>
+          </a:fontRef>
+        </p:style>
+        <p:txBody>
+          <a:bodyPr rtlCol="0" anchor="ctr"/>
+          <a:lstStyle/>
+          <a:p>
+            <a:pPr algn="ctr"/>
+            <a:endParaRPr lang="en-US"/>
+          </a:p>
+        </p:txBody>
+      </p:sp>
+      <mc:AlternateContent xmlns:mc="http://schemas.openxmlformats.org/markup-compatibility/2006">
+        <mc:Choice xmlns:a14="http://schemas.microsoft.com/office/drawing/2010/main" Requires="a14">
+          <p:sp>
+            <p:nvSpPr>
+              <p:cNvPr id="18" name="TextBox 17">
+                <a:extLst>
+                  <a:ext uri="{FF2B5EF4-FFF2-40B4-BE49-F238E27FC236}">
+                    <a16:creationId xmlns:a16="http://schemas.microsoft.com/office/drawing/2014/main" id="{2CFED8A8-9E02-4F65-8543-EEDDE141D5DE}"/>
+                  </a:ext>
+                </a:extLst>
+              </p:cNvPr>
+              <p:cNvSpPr txBox="1"/>
+              <p:nvPr/>
+            </p:nvSpPr>
+            <p:spPr>
+              <a:xfrm>
+                <a:off x="523419" y="5953400"/>
+                <a:ext cx="2323200" cy="532197"/>
+              </a:xfrm>
+              <a:prstGeom prst="rect">
+                <a:avLst/>
+              </a:prstGeom>
+              <a:noFill/>
+            </p:spPr>
+            <p:txBody>
+              <a:bodyPr wrap="none" lIns="0" tIns="0" rIns="0" bIns="0" rtlCol="0">
+                <a:spAutoFit/>
+              </a:bodyPr>
+              <a:lstStyle/>
+              <a:p>
+                <a14:m>
+                  <m:oMathPara xmlns:m="http://schemas.openxmlformats.org/officeDocument/2006/math">
+                    <m:oMathParaPr>
+                      <m:jc m:val="centerGroup"/>
+                    </m:oMathParaPr>
+                    <m:oMath xmlns:m="http://schemas.openxmlformats.org/officeDocument/2006/math">
+                      <m:f>
+                        <m:fPr>
+                          <m:ctrlPr>
+                            <a:rPr lang="en-US" b="0" i="1" smtClean="0">
+                              <a:latin typeface="Cambria Math" panose="02040503050406030204" pitchFamily="18" charset="0"/>
+                            </a:rPr>
+                          </m:ctrlPr>
+                        </m:fPr>
+                        <m:num>
+                          <m:r>
+                            <a:rPr lang="en-US" b="0" i="1" smtClean="0">
+                              <a:latin typeface="Cambria Math" panose="02040503050406030204" pitchFamily="18" charset="0"/>
+                            </a:rPr>
+                            <m:t>𝑑</m:t>
+                          </m:r>
+                          <m:r>
+                            <a:rPr lang="en-US" b="0" i="1" smtClean="0">
+                              <a:latin typeface="Cambria Math" panose="02040503050406030204" pitchFamily="18" charset="0"/>
+                              <a:ea typeface="Cambria Math" panose="02040503050406030204" pitchFamily="18" charset="0"/>
+                            </a:rPr>
+                            <m:t>∆</m:t>
+                          </m:r>
+                          <m:r>
+                            <a:rPr lang="en-US" b="0" i="1" smtClean="0">
+                              <a:latin typeface="Cambria Math" panose="02040503050406030204" pitchFamily="18" charset="0"/>
+                              <a:ea typeface="Cambria Math" panose="02040503050406030204" pitchFamily="18" charset="0"/>
+                            </a:rPr>
+                            <m:t>𝑆𝑁𝐶</m:t>
+                          </m:r>
+                        </m:num>
+                        <m:den>
+                          <m:r>
+                            <a:rPr lang="en-US" b="0" i="1" smtClean="0">
+                              <a:latin typeface="Cambria Math" panose="02040503050406030204" pitchFamily="18" charset="0"/>
+                            </a:rPr>
+                            <m:t>𝑑𝑡</m:t>
+                          </m:r>
+                        </m:den>
+                      </m:f>
+                      <m:r>
+                        <a:rPr lang="en-US" b="0" i="1" smtClean="0">
+                          <a:latin typeface="Cambria Math" panose="02040503050406030204" pitchFamily="18" charset="0"/>
+                        </a:rPr>
+                        <m:t>=</m:t>
+                      </m:r>
+                      <m:f>
+                        <m:fPr>
+                          <m:ctrlPr>
+                            <a:rPr lang="en-US" b="0" i="1" smtClean="0">
+                              <a:latin typeface="Cambria Math" panose="02040503050406030204" pitchFamily="18" charset="0"/>
+                            </a:rPr>
+                          </m:ctrlPr>
+                        </m:fPr>
+                        <m:num>
+                          <m:r>
+                            <a:rPr lang="en-US" b="0" i="1" smtClean="0">
+                              <a:latin typeface="Cambria Math" panose="02040503050406030204" pitchFamily="18" charset="0"/>
+                            </a:rPr>
+                            <m:t>𝑑</m:t>
+                          </m:r>
+                          <m:r>
+                            <a:rPr lang="en-US" b="0" i="1" smtClean="0">
+                              <a:latin typeface="Cambria Math" panose="02040503050406030204" pitchFamily="18" charset="0"/>
+                            </a:rPr>
+                            <m:t>(∆</m:t>
+                          </m:r>
+                          <m:r>
+                            <a:rPr lang="en-US" b="0" i="1" smtClean="0">
+                              <a:latin typeface="Cambria Math" panose="02040503050406030204" pitchFamily="18" charset="0"/>
+                              <a:ea typeface="Cambria Math" panose="02040503050406030204" pitchFamily="18" charset="0"/>
+                            </a:rPr>
+                            <m:t>𝑆𝑁𝐶</m:t>
+                          </m:r>
+                          <m:r>
+                            <a:rPr lang="en-US" b="0" i="1" smtClean="0">
+                              <a:latin typeface="Cambria Math" panose="02040503050406030204" pitchFamily="18" charset="0"/>
+                              <a:ea typeface="Cambria Math" panose="02040503050406030204" pitchFamily="18" charset="0"/>
+                            </a:rPr>
+                            <m:t>)/</m:t>
+                          </m:r>
+                          <m:r>
+                            <a:rPr lang="en-US" b="0" i="1" smtClean="0">
+                              <a:latin typeface="Cambria Math" panose="02040503050406030204" pitchFamily="18" charset="0"/>
+                              <a:ea typeface="Cambria Math" panose="02040503050406030204" pitchFamily="18" charset="0"/>
+                            </a:rPr>
+                            <m:t>𝑑𝑡</m:t>
+                          </m:r>
+                        </m:num>
+                        <m:den>
+                          <m:r>
+                            <a:rPr lang="en-US" b="0" i="1" smtClean="0">
+                              <a:latin typeface="Cambria Math" panose="02040503050406030204" pitchFamily="18" charset="0"/>
+                            </a:rPr>
+                            <m:t>1+</m:t>
+                          </m:r>
+                          <m:sSup>
+                            <m:sSupPr>
+                              <m:ctrlPr>
+                                <a:rPr lang="en-US" b="0" i="1" smtClean="0">
+                                  <a:latin typeface="Cambria Math" panose="02040503050406030204" pitchFamily="18" charset="0"/>
+                                </a:rPr>
+                              </m:ctrlPr>
+                            </m:sSupPr>
+                            <m:e>
+                              <m:r>
+                                <a:rPr lang="en-US" b="0" i="1" smtClean="0">
+                                  <a:latin typeface="Cambria Math" panose="02040503050406030204" pitchFamily="18" charset="0"/>
+                                  <a:ea typeface="Cambria Math" panose="02040503050406030204" pitchFamily="18" charset="0"/>
+                                </a:rPr>
+                                <m:t>∆</m:t>
+                              </m:r>
+                              <m:r>
+                                <a:rPr lang="en-US" b="0" i="1" smtClean="0">
+                                  <a:latin typeface="Cambria Math" panose="02040503050406030204" pitchFamily="18" charset="0"/>
+                                  <a:ea typeface="Cambria Math" panose="02040503050406030204" pitchFamily="18" charset="0"/>
+                                </a:rPr>
+                                <m:t>𝑆𝑁𝐶</m:t>
+                              </m:r>
+                            </m:e>
+                            <m:sup>
+                              <m:r>
+                                <a:rPr lang="en-US" b="0" i="1" smtClean="0">
+                                  <a:latin typeface="Cambria Math" panose="02040503050406030204" pitchFamily="18" charset="0"/>
+                                </a:rPr>
+                                <m:t>2</m:t>
+                              </m:r>
+                            </m:sup>
+                          </m:sSup>
+                        </m:den>
+                      </m:f>
+                    </m:oMath>
+                  </m:oMathPara>
+                </a14:m>
+                <a:endParaRPr lang="en-US" dirty="0"/>
+              </a:p>
+            </p:txBody>
+          </p:sp>
+        </mc:Choice>
+        <mc:Fallback>
+          <p:sp>
+            <p:nvSpPr>
+              <p:cNvPr id="18" name="TextBox 17">
+                <a:extLst>
+                  <a:ext uri="{FF2B5EF4-FFF2-40B4-BE49-F238E27FC236}">
+                    <a16:creationId xmlns:a16="http://schemas.microsoft.com/office/drawing/2014/main" id="{2CFED8A8-9E02-4F65-8543-EEDDE141D5DE}"/>
+                  </a:ext>
+                </a:extLst>
+              </p:cNvPr>
+              <p:cNvSpPr txBox="1">
+                <a:spLocks noRot="1" noChangeAspect="1" noMove="1" noResize="1" noEditPoints="1" noAdjustHandles="1" noChangeArrowheads="1" noChangeShapeType="1" noTextEdit="1"/>
+              </p:cNvSpPr>
+              <p:nvPr/>
+            </p:nvSpPr>
+            <p:spPr>
+              <a:xfrm>
+                <a:off x="523419" y="5953400"/>
+                <a:ext cx="2323200" cy="532197"/>
+              </a:xfrm>
+              <a:prstGeom prst="rect">
+                <a:avLst/>
+              </a:prstGeom>
+              <a:blipFill>
+                <a:blip r:embed="rId16"/>
+                <a:stretch>
+                  <a:fillRect/>
                 </a:stretch>
               </a:blipFill>
             </p:spPr>

</xml_diff>

<commit_message>
Rev 0.4:  Bunch of changes.   Updated doc's.
</commit_message>
<xml_diff>
--- a/Hot Pursuit/IPS.pptx
+++ b/Hot Pursuit/IPS.pptx
@@ -118,13 +118,68 @@
 <file path=ppt/revisionInfo.xml><?xml version="1.0" encoding="utf-8"?>
 <p1510:revInfo xmlns:a="http://schemas.openxmlformats.org/drawingml/2006/main" xmlns:r="http://schemas.openxmlformats.org/officeDocument/2006/relationships" xmlns:p1510="http://schemas.microsoft.com/office/powerpoint/2015/10/main">
   <p1510:revLst>
-    <p1510:client id="{E41D39D8-1DDF-4D16-8E53-9090773FDB52}" v="768" dt="2021-05-19T23:57:07.314"/>
+    <p1510:client id="{AC9E2B05-E9DC-482B-9E68-1D609AE5FBEA}" v="1" dt="2022-01-30T01:19:05.186"/>
   </p1510:revLst>
 </p1510:revInfo>
 </file>
 
 <file path=ppt/changesInfos/changesInfo1.xml><?xml version="1.0" encoding="utf-8"?>
 <pc:chgInfo xmlns:a="http://schemas.openxmlformats.org/drawingml/2006/main" xmlns:r="http://schemas.openxmlformats.org/officeDocument/2006/relationships" xmlns:ac="http://schemas.microsoft.com/office/drawing/2013/main/command" xmlns:pc="http://schemas.microsoft.com/office/powerpoint/2013/main/command">
+  <pc:docChgLst>
+    <pc:chgData name="Rick McAlister" userId="fad37fcb1da1ebec" providerId="LiveId" clId="{AC9E2B05-E9DC-482B-9E68-1D609AE5FBEA}"/>
+    <pc:docChg chg="custSel modSld">
+      <pc:chgData name="Rick McAlister" userId="fad37fcb1da1ebec" providerId="LiveId" clId="{AC9E2B05-E9DC-482B-9E68-1D609AE5FBEA}" dt="2022-01-30T01:20:33.358" v="68" actId="20577"/>
+      <pc:docMkLst>
+        <pc:docMk/>
+      </pc:docMkLst>
+      <pc:sldChg chg="addSp modSp mod">
+        <pc:chgData name="Rick McAlister" userId="fad37fcb1da1ebec" providerId="LiveId" clId="{AC9E2B05-E9DC-482B-9E68-1D609AE5FBEA}" dt="2022-01-30T01:19:31.652" v="15" actId="20577"/>
+        <pc:sldMkLst>
+          <pc:docMk/>
+          <pc:sldMk cId="2168399988" sldId="256"/>
+        </pc:sldMkLst>
+        <pc:spChg chg="mod">
+          <ac:chgData name="Rick McAlister" userId="fad37fcb1da1ebec" providerId="LiveId" clId="{AC9E2B05-E9DC-482B-9E68-1D609AE5FBEA}" dt="2022-01-30T01:19:08.975" v="1" actId="1076"/>
+          <ac:spMkLst>
+            <pc:docMk/>
+            <pc:sldMk cId="2168399988" sldId="256"/>
+            <ac:spMk id="10" creationId="{423EB3C8-DDFF-48F7-AA6F-5162B4695F58}"/>
+          </ac:spMkLst>
+        </pc:spChg>
+        <pc:spChg chg="add mod">
+          <ac:chgData name="Rick McAlister" userId="fad37fcb1da1ebec" providerId="LiveId" clId="{AC9E2B05-E9DC-482B-9E68-1D609AE5FBEA}" dt="2022-01-30T01:19:31.652" v="15" actId="20577"/>
+          <ac:spMkLst>
+            <pc:docMk/>
+            <pc:sldMk cId="2168399988" sldId="256"/>
+            <ac:spMk id="21" creationId="{2626E4B0-0F1A-4C83-A493-0D9B66645390}"/>
+          </ac:spMkLst>
+        </pc:spChg>
+      </pc:sldChg>
+      <pc:sldChg chg="modSp mod">
+        <pc:chgData name="Rick McAlister" userId="fad37fcb1da1ebec" providerId="LiveId" clId="{AC9E2B05-E9DC-482B-9E68-1D609AE5FBEA}" dt="2022-01-30T01:20:33.358" v="68" actId="20577"/>
+        <pc:sldMkLst>
+          <pc:docMk/>
+          <pc:sldMk cId="2890310457" sldId="259"/>
+        </pc:sldMkLst>
+        <pc:spChg chg="mod">
+          <ac:chgData name="Rick McAlister" userId="fad37fcb1da1ebec" providerId="LiveId" clId="{AC9E2B05-E9DC-482B-9E68-1D609AE5FBEA}" dt="2022-01-30T01:19:55.343" v="39" actId="20577"/>
+          <ac:spMkLst>
+            <pc:docMk/>
+            <pc:sldMk cId="2890310457" sldId="259"/>
+            <ac:spMk id="8" creationId="{EF26EE1A-3B51-471B-B67D-8905870ACFAF}"/>
+          </ac:spMkLst>
+        </pc:spChg>
+        <pc:spChg chg="mod">
+          <ac:chgData name="Rick McAlister" userId="fad37fcb1da1ebec" providerId="LiveId" clId="{AC9E2B05-E9DC-482B-9E68-1D609AE5FBEA}" dt="2022-01-30T01:20:33.358" v="68" actId="20577"/>
+          <ac:spMkLst>
+            <pc:docMk/>
+            <pc:sldMk cId="2890310457" sldId="259"/>
+            <ac:spMk id="22" creationId="{9971AA59-8313-4A9F-8461-264F182E7029}"/>
+          </ac:spMkLst>
+        </pc:spChg>
+      </pc:sldChg>
+    </pc:docChg>
+  </pc:docChgLst>
   <pc:docChgLst>
     <pc:chgData name="Rick McAlister" userId="fad37fcb1da1ebec" providerId="LiveId" clId="{E41D39D8-1DDF-4D16-8E53-9090773FDB52}"/>
     <pc:docChg chg="undo redo custSel modSld">
@@ -1639,7 +1694,7 @@
           <a:p>
             <a:fld id="{F3FFCF3C-4A0D-4637-8D0F-A75E6B068A0D}" type="datetimeFigureOut">
               <a:rPr lang="en-US" smtClean="0"/>
-              <a:t>5/19/2021</a:t>
+              <a:t>1/29/2022</a:t>
             </a:fld>
             <a:endParaRPr lang="en-US"/>
           </a:p>
@@ -1837,7 +1892,7 @@
           <a:p>
             <a:fld id="{F3FFCF3C-4A0D-4637-8D0F-A75E6B068A0D}" type="datetimeFigureOut">
               <a:rPr lang="en-US" smtClean="0"/>
-              <a:t>5/19/2021</a:t>
+              <a:t>1/29/2022</a:t>
             </a:fld>
             <a:endParaRPr lang="en-US"/>
           </a:p>
@@ -2045,7 +2100,7 @@
           <a:p>
             <a:fld id="{F3FFCF3C-4A0D-4637-8D0F-A75E6B068A0D}" type="datetimeFigureOut">
               <a:rPr lang="en-US" smtClean="0"/>
-              <a:t>5/19/2021</a:t>
+              <a:t>1/29/2022</a:t>
             </a:fld>
             <a:endParaRPr lang="en-US"/>
           </a:p>
@@ -2243,7 +2298,7 @@
           <a:p>
             <a:fld id="{F3FFCF3C-4A0D-4637-8D0F-A75E6B068A0D}" type="datetimeFigureOut">
               <a:rPr lang="en-US" smtClean="0"/>
-              <a:t>5/19/2021</a:t>
+              <a:t>1/29/2022</a:t>
             </a:fld>
             <a:endParaRPr lang="en-US"/>
           </a:p>
@@ -2518,7 +2573,7 @@
           <a:p>
             <a:fld id="{F3FFCF3C-4A0D-4637-8D0F-A75E6B068A0D}" type="datetimeFigureOut">
               <a:rPr lang="en-US" smtClean="0"/>
-              <a:t>5/19/2021</a:t>
+              <a:t>1/29/2022</a:t>
             </a:fld>
             <a:endParaRPr lang="en-US"/>
           </a:p>
@@ -2783,7 +2838,7 @@
           <a:p>
             <a:fld id="{F3FFCF3C-4A0D-4637-8D0F-A75E6B068A0D}" type="datetimeFigureOut">
               <a:rPr lang="en-US" smtClean="0"/>
-              <a:t>5/19/2021</a:t>
+              <a:t>1/29/2022</a:t>
             </a:fld>
             <a:endParaRPr lang="en-US"/>
           </a:p>
@@ -3195,7 +3250,7 @@
           <a:p>
             <a:fld id="{F3FFCF3C-4A0D-4637-8D0F-A75E6B068A0D}" type="datetimeFigureOut">
               <a:rPr lang="en-US" smtClean="0"/>
-              <a:t>5/19/2021</a:t>
+              <a:t>1/29/2022</a:t>
             </a:fld>
             <a:endParaRPr lang="en-US"/>
           </a:p>
@@ -3336,7 +3391,7 @@
           <a:p>
             <a:fld id="{F3FFCF3C-4A0D-4637-8D0F-A75E6B068A0D}" type="datetimeFigureOut">
               <a:rPr lang="en-US" smtClean="0"/>
-              <a:t>5/19/2021</a:t>
+              <a:t>1/29/2022</a:t>
             </a:fld>
             <a:endParaRPr lang="en-US"/>
           </a:p>
@@ -3449,7 +3504,7 @@
           <a:p>
             <a:fld id="{F3FFCF3C-4A0D-4637-8D0F-A75E6B068A0D}" type="datetimeFigureOut">
               <a:rPr lang="en-US" smtClean="0"/>
-              <a:t>5/19/2021</a:t>
+              <a:t>1/29/2022</a:t>
             </a:fld>
             <a:endParaRPr lang="en-US"/>
           </a:p>
@@ -3760,7 +3815,7 @@
           <a:p>
             <a:fld id="{F3FFCF3C-4A0D-4637-8D0F-A75E6B068A0D}" type="datetimeFigureOut">
               <a:rPr lang="en-US" smtClean="0"/>
-              <a:t>5/19/2021</a:t>
+              <a:t>1/29/2022</a:t>
             </a:fld>
             <a:endParaRPr lang="en-US"/>
           </a:p>
@@ -4048,7 +4103,7 @@
           <a:p>
             <a:fld id="{F3FFCF3C-4A0D-4637-8D0F-A75E6B068A0D}" type="datetimeFigureOut">
               <a:rPr lang="en-US" smtClean="0"/>
-              <a:t>5/19/2021</a:t>
+              <a:t>1/29/2022</a:t>
             </a:fld>
             <a:endParaRPr lang="en-US"/>
           </a:p>
@@ -4289,7 +4344,7 @@
           <a:p>
             <a:fld id="{F3FFCF3C-4A0D-4637-8D0F-A75E6B068A0D}" type="datetimeFigureOut">
               <a:rPr lang="en-US" smtClean="0"/>
-              <a:t>5/19/2021</a:t>
+              <a:t>1/29/2022</a:t>
             </a:fld>
             <a:endParaRPr lang="en-US"/>
           </a:p>
@@ -4906,7 +4961,7 @@
         </p:nvSpPr>
         <p:spPr>
           <a:xfrm>
-            <a:off x="455551" y="3071757"/>
+            <a:off x="543365" y="2535069"/>
             <a:ext cx="1741394" cy="450476"/>
           </a:xfrm>
           <a:prstGeom prst="flowChartAlternateProcess">
@@ -5775,6 +5830,55 @@
           </a:fontRef>
         </p:style>
       </p:cxnSp>
+      <p:sp>
+        <p:nvSpPr>
+          <p:cNvPr id="21" name="Flowchart: Alternate Process 20">
+            <a:extLst>
+              <a:ext uri="{FF2B5EF4-FFF2-40B4-BE49-F238E27FC236}">
+                <a16:creationId xmlns:a16="http://schemas.microsoft.com/office/drawing/2014/main" id="{2626E4B0-0F1A-4C83-A493-0D9B66645390}"/>
+              </a:ext>
+            </a:extLst>
+          </p:cNvPr>
+          <p:cNvSpPr/>
+          <p:nvPr/>
+        </p:nvSpPr>
+        <p:spPr>
+          <a:xfrm>
+            <a:off x="553831" y="3548356"/>
+            <a:ext cx="1741394" cy="450476"/>
+          </a:xfrm>
+          <a:prstGeom prst="flowChartAlternateProcess">
+            <a:avLst/>
+          </a:prstGeom>
+        </p:spPr>
+        <p:style>
+          <a:lnRef idx="2">
+            <a:schemeClr val="accent6">
+              <a:shade val="50000"/>
+            </a:schemeClr>
+          </a:lnRef>
+          <a:fillRef idx="1">
+            <a:schemeClr val="accent6"/>
+          </a:fillRef>
+          <a:effectRef idx="0">
+            <a:schemeClr val="accent6"/>
+          </a:effectRef>
+          <a:fontRef idx="minor">
+            <a:schemeClr val="lt1"/>
+          </a:fontRef>
+        </p:style>
+        <p:txBody>
+          <a:bodyPr rtlCol="0" anchor="ctr"/>
+          <a:lstStyle/>
+          <a:p>
+            <a:pPr algn="ctr"/>
+            <a:r>
+              <a:rPr lang="en-US" dirty="0"/>
+              <a:t>NASA Horizons</a:t>
+            </a:r>
+          </a:p>
+        </p:txBody>
+      </p:sp>
     </p:spTree>
     <p:extLst>
       <p:ext uri="{BB962C8B-B14F-4D97-AF65-F5344CB8AC3E}">
@@ -6090,6 +6194,39 @@
               <a:t>Scout</a:t>
             </a:r>
           </a:p>
+          <a:p>
+            <a:pPr algn="ctr"/>
+            <a:r>
+              <a:rPr lang="en-US" sz="1400" dirty="0">
+                <a:solidFill>
+                  <a:schemeClr val="tx1"/>
+                </a:solidFill>
+              </a:rPr>
+              <a:t>or</a:t>
+            </a:r>
+          </a:p>
+          <a:p>
+            <a:pPr algn="ctr"/>
+            <a:r>
+              <a:rPr lang="en-US" sz="1400" dirty="0">
+                <a:solidFill>
+                  <a:schemeClr val="tx1"/>
+                </a:solidFill>
+              </a:rPr>
+              <a:t>NASA</a:t>
+            </a:r>
+          </a:p>
+          <a:p>
+            <a:pPr algn="ctr"/>
+            <a:r>
+              <a:rPr lang="en-US" sz="1400" dirty="0">
+                <a:solidFill>
+                  <a:schemeClr val="tx1"/>
+                </a:solidFill>
+              </a:rPr>
+              <a:t>Horizons</a:t>
+            </a:r>
+          </a:p>
         </p:txBody>
       </p:sp>
       <p:cxnSp>
@@ -6401,6 +6538,13 @@
             <a:r>
               <a:rPr lang="en-US" sz="1400" dirty="0"/>
               <a:t>Site Translation</a:t>
+            </a:r>
+          </a:p>
+          <a:p>
+            <a:pPr algn="ctr"/>
+            <a:r>
+              <a:rPr lang="en-US" sz="1400" dirty="0"/>
+              <a:t>(if required)</a:t>
             </a:r>
           </a:p>
         </p:txBody>
@@ -10102,8 +10246,8 @@
           </a:p>
         </p:txBody>
       </p:sp>
-      <mc:AlternateContent xmlns:mc="http://schemas.openxmlformats.org/markup-compatibility/2006">
-        <mc:Choice xmlns:a14="http://schemas.microsoft.com/office/drawing/2010/main" Requires="a14">
+      <mc:AlternateContent xmlns:mc="http://schemas.openxmlformats.org/markup-compatibility/2006" xmlns:a14="http://schemas.microsoft.com/office/drawing/2010/main">
+        <mc:Choice Requires="a14">
           <p:sp>
             <p:nvSpPr>
               <p:cNvPr id="18" name="TextBox 17">
@@ -10132,6 +10276,7 @@
               </a:bodyPr>
               <a:lstStyle/>
               <a:p>
+                <a:pPr/>
                 <a14:m>
                   <m:oMathPara xmlns:m="http://schemas.openxmlformats.org/officeDocument/2006/math">
                     <m:oMathParaPr>
@@ -10276,7 +10421,7 @@
             </p:txBody>
           </p:sp>
         </mc:Choice>
-        <mc:Fallback>
+        <mc:Fallback xmlns="">
           <p:sp>
             <p:nvSpPr>
               <p:cNvPr id="18" name="TextBox 17">

</xml_diff>